<commit_message>
Update Global Azure-2025 - Llama Stack.pptx
</commit_message>
<xml_diff>
--- a/GA2025-BLR/Global Azure-2025 - Llama Stack.pptx
+++ b/GA2025-BLR/Global Azure-2025 - Llama Stack.pptx
@@ -4,18 +4,21 @@
   <p:sldMasterIdLst>
     <p:sldMasterId id="2147483648" r:id="rId1"/>
   </p:sldMasterIdLst>
+  <p:notesMasterIdLst>
+    <p:notesMasterId r:id="rId13"/>
+  </p:notesMasterIdLst>
   <p:sldIdLst>
     <p:sldId id="256" r:id="rId2"/>
     <p:sldId id="257" r:id="rId3"/>
     <p:sldId id="265" r:id="rId4"/>
-    <p:sldId id="268" r:id="rId5"/>
-    <p:sldId id="267" r:id="rId6"/>
-    <p:sldId id="271" r:id="rId7"/>
-    <p:sldId id="270" r:id="rId8"/>
-    <p:sldId id="272" r:id="rId9"/>
-    <p:sldId id="263" r:id="rId10"/>
-    <p:sldId id="262" r:id="rId11"/>
-    <p:sldId id="261" r:id="rId12"/>
+    <p:sldId id="273" r:id="rId5"/>
+    <p:sldId id="268" r:id="rId6"/>
+    <p:sldId id="267" r:id="rId7"/>
+    <p:sldId id="271" r:id="rId8"/>
+    <p:sldId id="270" r:id="rId9"/>
+    <p:sldId id="272" r:id="rId10"/>
+    <p:sldId id="263" r:id="rId11"/>
+    <p:sldId id="262" r:id="rId12"/>
   </p:sldIdLst>
   <p:sldSz cx="12192000" cy="6858000"/>
   <p:notesSz cx="6858000" cy="9144000"/>
@@ -499,6 +502,1699 @@
 </pc:chgInfo>
 </file>
 
+<file path=ppt/notesMasters/notesMaster1.xml><?xml version="1.0" encoding="utf-8"?>
+<p:notesMaster xmlns:a="http://schemas.openxmlformats.org/drawingml/2006/main" xmlns:r="http://schemas.openxmlformats.org/officeDocument/2006/relationships" xmlns:p="http://schemas.openxmlformats.org/presentationml/2006/main">
+  <p:cSld>
+    <p:bg>
+      <p:bgRef idx="1001">
+        <a:schemeClr val="bg1"/>
+      </p:bgRef>
+    </p:bg>
+    <p:spTree>
+      <p:nvGrpSpPr>
+        <p:cNvPr id="1" name=""/>
+        <p:cNvGrpSpPr/>
+        <p:nvPr/>
+      </p:nvGrpSpPr>
+      <p:grpSpPr>
+        <a:xfrm>
+          <a:off x="0" y="0"/>
+          <a:ext cx="0" cy="0"/>
+          <a:chOff x="0" y="0"/>
+          <a:chExt cx="0" cy="0"/>
+        </a:xfrm>
+      </p:grpSpPr>
+      <p:sp>
+        <p:nvSpPr>
+          <p:cNvPr id="2" name="Header Placeholder 1"/>
+          <p:cNvSpPr>
+            <a:spLocks noGrp="1"/>
+          </p:cNvSpPr>
+          <p:nvPr>
+            <p:ph type="hdr" sz="quarter"/>
+          </p:nvPr>
+        </p:nvSpPr>
+        <p:spPr>
+          <a:xfrm>
+            <a:off x="0" y="0"/>
+            <a:ext cx="2971800" cy="458788"/>
+          </a:xfrm>
+          <a:prstGeom prst="rect">
+            <a:avLst/>
+          </a:prstGeom>
+        </p:spPr>
+        <p:txBody>
+          <a:bodyPr vert="horz" lIns="91440" tIns="45720" rIns="91440" bIns="45720" rtlCol="0"/>
+          <a:lstStyle>
+            <a:lvl1pPr algn="l">
+              <a:defRPr sz="1200"/>
+            </a:lvl1pPr>
+          </a:lstStyle>
+          <a:p>
+            <a:endParaRPr lang="en-IN"/>
+          </a:p>
+        </p:txBody>
+      </p:sp>
+      <p:sp>
+        <p:nvSpPr>
+          <p:cNvPr id="3" name="Date Placeholder 2"/>
+          <p:cNvSpPr>
+            <a:spLocks noGrp="1"/>
+          </p:cNvSpPr>
+          <p:nvPr>
+            <p:ph type="dt" idx="1"/>
+          </p:nvPr>
+        </p:nvSpPr>
+        <p:spPr>
+          <a:xfrm>
+            <a:off x="3884613" y="0"/>
+            <a:ext cx="2971800" cy="458788"/>
+          </a:xfrm>
+          <a:prstGeom prst="rect">
+            <a:avLst/>
+          </a:prstGeom>
+        </p:spPr>
+        <p:txBody>
+          <a:bodyPr vert="horz" lIns="91440" tIns="45720" rIns="91440" bIns="45720" rtlCol="0"/>
+          <a:lstStyle>
+            <a:lvl1pPr algn="r">
+              <a:defRPr sz="1200"/>
+            </a:lvl1pPr>
+          </a:lstStyle>
+          <a:p>
+            <a:fld id="{AD5A8F25-DF95-45E0-8F7F-CEE6A012F855}" type="datetimeFigureOut">
+              <a:rPr lang="en-IN" smtClean="0"/>
+              <a:t>10-05-2025</a:t>
+            </a:fld>
+            <a:endParaRPr lang="en-IN"/>
+          </a:p>
+        </p:txBody>
+      </p:sp>
+      <p:sp>
+        <p:nvSpPr>
+          <p:cNvPr id="4" name="Slide Image Placeholder 3"/>
+          <p:cNvSpPr>
+            <a:spLocks noGrp="1" noRot="1" noChangeAspect="1"/>
+          </p:cNvSpPr>
+          <p:nvPr>
+            <p:ph type="sldImg" idx="2"/>
+          </p:nvPr>
+        </p:nvSpPr>
+        <p:spPr>
+          <a:xfrm>
+            <a:off x="685800" y="1143000"/>
+            <a:ext cx="5486400" cy="3086100"/>
+          </a:xfrm>
+          <a:prstGeom prst="rect">
+            <a:avLst/>
+          </a:prstGeom>
+          <a:noFill/>
+          <a:ln w="12700">
+            <a:solidFill>
+              <a:prstClr val="black"/>
+            </a:solidFill>
+          </a:ln>
+        </p:spPr>
+        <p:txBody>
+          <a:bodyPr vert="horz" lIns="91440" tIns="45720" rIns="91440" bIns="45720" rtlCol="0" anchor="ctr"/>
+          <a:lstStyle/>
+          <a:p>
+            <a:endParaRPr lang="en-IN"/>
+          </a:p>
+        </p:txBody>
+      </p:sp>
+      <p:sp>
+        <p:nvSpPr>
+          <p:cNvPr id="5" name="Notes Placeholder 4"/>
+          <p:cNvSpPr>
+            <a:spLocks noGrp="1"/>
+          </p:cNvSpPr>
+          <p:nvPr>
+            <p:ph type="body" sz="quarter" idx="3"/>
+          </p:nvPr>
+        </p:nvSpPr>
+        <p:spPr>
+          <a:xfrm>
+            <a:off x="685800" y="4400550"/>
+            <a:ext cx="5486400" cy="3600450"/>
+          </a:xfrm>
+          <a:prstGeom prst="rect">
+            <a:avLst/>
+          </a:prstGeom>
+        </p:spPr>
+        <p:txBody>
+          <a:bodyPr vert="horz" lIns="91440" tIns="45720" rIns="91440" bIns="45720" rtlCol="0"/>
+          <a:lstStyle/>
+          <a:p>
+            <a:pPr lvl="0"/>
+            <a:r>
+              <a:rPr lang="en-US"/>
+              <a:t>Click to edit Master text styles</a:t>
+            </a:r>
+          </a:p>
+          <a:p>
+            <a:pPr lvl="1"/>
+            <a:r>
+              <a:rPr lang="en-US"/>
+              <a:t>Second level</a:t>
+            </a:r>
+          </a:p>
+          <a:p>
+            <a:pPr lvl="2"/>
+            <a:r>
+              <a:rPr lang="en-US"/>
+              <a:t>Third level</a:t>
+            </a:r>
+          </a:p>
+          <a:p>
+            <a:pPr lvl="3"/>
+            <a:r>
+              <a:rPr lang="en-US"/>
+              <a:t>Fourth level</a:t>
+            </a:r>
+          </a:p>
+          <a:p>
+            <a:pPr lvl="4"/>
+            <a:r>
+              <a:rPr lang="en-US"/>
+              <a:t>Fifth level</a:t>
+            </a:r>
+            <a:endParaRPr lang="en-IN"/>
+          </a:p>
+        </p:txBody>
+      </p:sp>
+      <p:sp>
+        <p:nvSpPr>
+          <p:cNvPr id="6" name="Footer Placeholder 5"/>
+          <p:cNvSpPr>
+            <a:spLocks noGrp="1"/>
+          </p:cNvSpPr>
+          <p:nvPr>
+            <p:ph type="ftr" sz="quarter" idx="4"/>
+          </p:nvPr>
+        </p:nvSpPr>
+        <p:spPr>
+          <a:xfrm>
+            <a:off x="0" y="8685213"/>
+            <a:ext cx="2971800" cy="458787"/>
+          </a:xfrm>
+          <a:prstGeom prst="rect">
+            <a:avLst/>
+          </a:prstGeom>
+        </p:spPr>
+        <p:txBody>
+          <a:bodyPr vert="horz" lIns="91440" tIns="45720" rIns="91440" bIns="45720" rtlCol="0" anchor="b"/>
+          <a:lstStyle>
+            <a:lvl1pPr algn="l">
+              <a:defRPr sz="1200"/>
+            </a:lvl1pPr>
+          </a:lstStyle>
+          <a:p>
+            <a:endParaRPr lang="en-IN"/>
+          </a:p>
+        </p:txBody>
+      </p:sp>
+      <p:sp>
+        <p:nvSpPr>
+          <p:cNvPr id="7" name="Slide Number Placeholder 6"/>
+          <p:cNvSpPr>
+            <a:spLocks noGrp="1"/>
+          </p:cNvSpPr>
+          <p:nvPr>
+            <p:ph type="sldNum" sz="quarter" idx="5"/>
+          </p:nvPr>
+        </p:nvSpPr>
+        <p:spPr>
+          <a:xfrm>
+            <a:off x="3884613" y="8685213"/>
+            <a:ext cx="2971800" cy="458787"/>
+          </a:xfrm>
+          <a:prstGeom prst="rect">
+            <a:avLst/>
+          </a:prstGeom>
+        </p:spPr>
+        <p:txBody>
+          <a:bodyPr vert="horz" lIns="91440" tIns="45720" rIns="91440" bIns="45720" rtlCol="0" anchor="b"/>
+          <a:lstStyle>
+            <a:lvl1pPr algn="r">
+              <a:defRPr sz="1200"/>
+            </a:lvl1pPr>
+          </a:lstStyle>
+          <a:p>
+            <a:fld id="{36145EA3-E9D9-4AAF-95C8-85BA2B757F37}" type="slidenum">
+              <a:rPr lang="en-IN" smtClean="0"/>
+              <a:t>‹#›</a:t>
+            </a:fld>
+            <a:endParaRPr lang="en-IN"/>
+          </a:p>
+        </p:txBody>
+      </p:sp>
+    </p:spTree>
+    <p:extLst>
+      <p:ext uri="{BB962C8B-B14F-4D97-AF65-F5344CB8AC3E}">
+        <p14:creationId xmlns:p14="http://schemas.microsoft.com/office/powerpoint/2010/main" val="1598134375"/>
+      </p:ext>
+    </p:extLst>
+  </p:cSld>
+  <p:clrMap bg1="lt1" tx1="dk1" bg2="lt2" tx2="dk2" accent1="accent1" accent2="accent2" accent3="accent3" accent4="accent4" accent5="accent5" accent6="accent6" hlink="hlink" folHlink="folHlink"/>
+  <p:notesStyle>
+    <a:lvl1pPr marL="0" algn="l" defTabSz="914400" rtl="0" eaLnBrk="1" latinLnBrk="0" hangingPunct="1">
+      <a:defRPr sz="1200" kern="1200">
+        <a:solidFill>
+          <a:schemeClr val="tx1"/>
+        </a:solidFill>
+        <a:latin typeface="+mn-lt"/>
+        <a:ea typeface="+mn-ea"/>
+        <a:cs typeface="+mn-cs"/>
+      </a:defRPr>
+    </a:lvl1pPr>
+    <a:lvl2pPr marL="457200" algn="l" defTabSz="914400" rtl="0" eaLnBrk="1" latinLnBrk="0" hangingPunct="1">
+      <a:defRPr sz="1200" kern="1200">
+        <a:solidFill>
+          <a:schemeClr val="tx1"/>
+        </a:solidFill>
+        <a:latin typeface="+mn-lt"/>
+        <a:ea typeface="+mn-ea"/>
+        <a:cs typeface="+mn-cs"/>
+      </a:defRPr>
+    </a:lvl2pPr>
+    <a:lvl3pPr marL="914400" algn="l" defTabSz="914400" rtl="0" eaLnBrk="1" latinLnBrk="0" hangingPunct="1">
+      <a:defRPr sz="1200" kern="1200">
+        <a:solidFill>
+          <a:schemeClr val="tx1"/>
+        </a:solidFill>
+        <a:latin typeface="+mn-lt"/>
+        <a:ea typeface="+mn-ea"/>
+        <a:cs typeface="+mn-cs"/>
+      </a:defRPr>
+    </a:lvl3pPr>
+    <a:lvl4pPr marL="1371600" algn="l" defTabSz="914400" rtl="0" eaLnBrk="1" latinLnBrk="0" hangingPunct="1">
+      <a:defRPr sz="1200" kern="1200">
+        <a:solidFill>
+          <a:schemeClr val="tx1"/>
+        </a:solidFill>
+        <a:latin typeface="+mn-lt"/>
+        <a:ea typeface="+mn-ea"/>
+        <a:cs typeface="+mn-cs"/>
+      </a:defRPr>
+    </a:lvl4pPr>
+    <a:lvl5pPr marL="1828800" algn="l" defTabSz="914400" rtl="0" eaLnBrk="1" latinLnBrk="0" hangingPunct="1">
+      <a:defRPr sz="1200" kern="1200">
+        <a:solidFill>
+          <a:schemeClr val="tx1"/>
+        </a:solidFill>
+        <a:latin typeface="+mn-lt"/>
+        <a:ea typeface="+mn-ea"/>
+        <a:cs typeface="+mn-cs"/>
+      </a:defRPr>
+    </a:lvl5pPr>
+    <a:lvl6pPr marL="2286000" algn="l" defTabSz="914400" rtl="0" eaLnBrk="1" latinLnBrk="0" hangingPunct="1">
+      <a:defRPr sz="1200" kern="1200">
+        <a:solidFill>
+          <a:schemeClr val="tx1"/>
+        </a:solidFill>
+        <a:latin typeface="+mn-lt"/>
+        <a:ea typeface="+mn-ea"/>
+        <a:cs typeface="+mn-cs"/>
+      </a:defRPr>
+    </a:lvl6pPr>
+    <a:lvl7pPr marL="2743200" algn="l" defTabSz="914400" rtl="0" eaLnBrk="1" latinLnBrk="0" hangingPunct="1">
+      <a:defRPr sz="1200" kern="1200">
+        <a:solidFill>
+          <a:schemeClr val="tx1"/>
+        </a:solidFill>
+        <a:latin typeface="+mn-lt"/>
+        <a:ea typeface="+mn-ea"/>
+        <a:cs typeface="+mn-cs"/>
+      </a:defRPr>
+    </a:lvl7pPr>
+    <a:lvl8pPr marL="3200400" algn="l" defTabSz="914400" rtl="0" eaLnBrk="1" latinLnBrk="0" hangingPunct="1">
+      <a:defRPr sz="1200" kern="1200">
+        <a:solidFill>
+          <a:schemeClr val="tx1"/>
+        </a:solidFill>
+        <a:latin typeface="+mn-lt"/>
+        <a:ea typeface="+mn-ea"/>
+        <a:cs typeface="+mn-cs"/>
+      </a:defRPr>
+    </a:lvl8pPr>
+    <a:lvl9pPr marL="3657600" algn="l" defTabSz="914400" rtl="0" eaLnBrk="1" latinLnBrk="0" hangingPunct="1">
+      <a:defRPr sz="1200" kern="1200">
+        <a:solidFill>
+          <a:schemeClr val="tx1"/>
+        </a:solidFill>
+        <a:latin typeface="+mn-lt"/>
+        <a:ea typeface="+mn-ea"/>
+        <a:cs typeface="+mn-cs"/>
+      </a:defRPr>
+    </a:lvl9pPr>
+  </p:notesStyle>
+</p:notesMaster>
+</file>
+
+<file path=ppt/notesSlides/notesSlide1.xml><?xml version="1.0" encoding="utf-8"?>
+<p:notes xmlns:a="http://schemas.openxmlformats.org/drawingml/2006/main" xmlns:r="http://schemas.openxmlformats.org/officeDocument/2006/relationships" xmlns:p="http://schemas.openxmlformats.org/presentationml/2006/main">
+  <p:cSld>
+    <p:spTree>
+      <p:nvGrpSpPr>
+        <p:cNvPr id="1" name=""/>
+        <p:cNvGrpSpPr/>
+        <p:nvPr/>
+      </p:nvGrpSpPr>
+      <p:grpSpPr>
+        <a:xfrm>
+          <a:off x="0" y="0"/>
+          <a:ext cx="0" cy="0"/>
+          <a:chOff x="0" y="0"/>
+          <a:chExt cx="0" cy="0"/>
+        </a:xfrm>
+      </p:grpSpPr>
+      <p:sp>
+        <p:nvSpPr>
+          <p:cNvPr id="2" name="Slide Image Placeholder 1"/>
+          <p:cNvSpPr>
+            <a:spLocks noGrp="1" noRot="1" noChangeAspect="1"/>
+          </p:cNvSpPr>
+          <p:nvPr>
+            <p:ph type="sldImg"/>
+          </p:nvPr>
+        </p:nvSpPr>
+        <p:spPr/>
+      </p:sp>
+      <p:sp>
+        <p:nvSpPr>
+          <p:cNvPr id="3" name="Notes Placeholder 2"/>
+          <p:cNvSpPr>
+            <a:spLocks noGrp="1"/>
+          </p:cNvSpPr>
+          <p:nvPr>
+            <p:ph type="body" idx="1"/>
+          </p:nvPr>
+        </p:nvSpPr>
+        <p:spPr/>
+        <p:txBody>
+          <a:bodyPr/>
+          <a:lstStyle/>
+          <a:p>
+            <a:r>
+              <a:rPr lang="en-US" b="0" i="0" dirty="0">
+                <a:effectLst/>
+                <a:latin typeface="-apple-system"/>
+              </a:rPr>
+              <a:t>If you have built distributed applications or systems, you will understand that the principles such as abstraction and decoupling are essential to manage dependencies on external services or microservices. Developing AI applications that are enterprise-grade is no different. If you're building features powered by a single LLM or orchestrating complex AI agents, a critical design principle is key: Abstract your AI implementation!</a:t>
+            </a:r>
+            <a:br>
+              <a:rPr lang="en-US" b="0" i="0" dirty="0">
+                <a:effectLst/>
+                <a:latin typeface="-apple-system"/>
+              </a:rPr>
+            </a:br>
+            <a:br>
+              <a:rPr lang="en-US" b="0" i="0" dirty="0">
+                <a:effectLst/>
+                <a:latin typeface="-apple-system"/>
+              </a:rPr>
+            </a:br>
+            <a:r>
+              <a:rPr lang="en-US" b="0" i="0" dirty="0">
+                <a:effectLst/>
+                <a:latin typeface="-apple-system"/>
+              </a:rPr>
+              <a:t>⚠️ The problem: Coupling your core application logic directly to a specific AI model endpoint, a particular agent framework or a sequence of AI calls can create significant difficulties down the line, similar to the challenges of tightly coupled distributed systems:</a:t>
+            </a:r>
+            <a:br>
+              <a:rPr lang="en-US" b="0" i="0" dirty="0">
+                <a:effectLst/>
+                <a:latin typeface="-apple-system"/>
+              </a:rPr>
+            </a:br>
+            <a:r>
+              <a:rPr lang="en-US" b="0" i="0" dirty="0">
+                <a:effectLst/>
+                <a:latin typeface="-apple-system"/>
+              </a:rPr>
+              <a:t>✴️ Complexity: Your application logic gets coupled with the specifics of how the AI task is performed.</a:t>
+            </a:r>
+            <a:br>
+              <a:rPr lang="en-US" b="0" i="0" dirty="0">
+                <a:effectLst/>
+                <a:latin typeface="-apple-system"/>
+              </a:rPr>
+            </a:br>
+            <a:r>
+              <a:rPr lang="en-US" b="0" i="0" dirty="0">
+                <a:effectLst/>
+                <a:latin typeface="-apple-system"/>
+              </a:rPr>
+              <a:t>✴️ Performance: Swapping for a faster model or optimizing an agentic workflow becomes difficult.</a:t>
+            </a:r>
+            <a:br>
+              <a:rPr lang="en-US" b="0" i="0" dirty="0">
+                <a:effectLst/>
+                <a:latin typeface="-apple-system"/>
+              </a:rPr>
+            </a:br>
+            <a:r>
+              <a:rPr lang="en-US" b="0" i="0" dirty="0">
+                <a:effectLst/>
+                <a:latin typeface="-apple-system"/>
+              </a:rPr>
+              <a:t>✴️ Governance: Adapting to new data handling rules or model requirements involves widespread code changes across tightly coupled components.</a:t>
+            </a:r>
+            <a:br>
+              <a:rPr lang="en-US" b="0" i="0" dirty="0">
+                <a:effectLst/>
+                <a:latin typeface="-apple-system"/>
+              </a:rPr>
+            </a:br>
+            <a:r>
+              <a:rPr lang="en-US" b="0" i="0" dirty="0">
+                <a:effectLst/>
+                <a:latin typeface="-apple-system"/>
+              </a:rPr>
+              <a:t>✴️ Innovation: Integrating newer, better models or more sophisticated agentic techniques requires costly refactoring, limiting your ability to leverage advancements.</a:t>
+            </a:r>
+            <a:br>
+              <a:rPr lang="en-US" b="0" i="0" dirty="0">
+                <a:effectLst/>
+                <a:latin typeface="-apple-system"/>
+              </a:rPr>
+            </a:br>
+            <a:br>
+              <a:rPr lang="en-US" b="0" i="0" dirty="0">
+                <a:effectLst/>
+                <a:latin typeface="-apple-system"/>
+              </a:rPr>
+            </a:br>
+            <a:r>
+              <a:rPr lang="en-US" b="0" i="0" dirty="0">
+                <a:effectLst/>
+                <a:latin typeface="-apple-system"/>
+              </a:rPr>
+              <a:t>💠 The Solution? Design an AI Abstraction Layer.</a:t>
+            </a:r>
+            <a:br>
+              <a:rPr lang="en-US" b="0" i="0" dirty="0">
+                <a:effectLst/>
+                <a:latin typeface="-apple-system"/>
+              </a:rPr>
+            </a:br>
+            <a:r>
+              <a:rPr lang="en-US" b="0" i="0" dirty="0">
+                <a:effectLst/>
+                <a:latin typeface="-apple-system"/>
+              </a:rPr>
+              <a:t>Build an interface (or a proxy) between your core application and the specific AI capability it needs. This layer exposes abstract functions and handles the underlying implementation details – whether that's calling a specific LLM API, running a multi-step agent, or interacting with a fine-tuned model.</a:t>
+            </a:r>
+            <a:br>
+              <a:rPr lang="en-US" b="0" i="0" dirty="0">
+                <a:effectLst/>
+                <a:latin typeface="-apple-system"/>
+              </a:rPr>
+            </a:br>
+            <a:r>
+              <a:rPr lang="en-US" b="0" i="0" dirty="0">
+                <a:effectLst/>
+                <a:latin typeface="-apple-system"/>
+              </a:rPr>
+              <a:t>This "abstract the AI" approach provides crucial flexibility, much like abstracting external services in a distributed system:</a:t>
+            </a:r>
+            <a:br>
+              <a:rPr lang="en-US" b="0" i="0" dirty="0">
+                <a:effectLst/>
+                <a:latin typeface="-apple-system"/>
+              </a:rPr>
+            </a:br>
+            <a:r>
+              <a:rPr lang="en-US" b="0" i="0" dirty="0">
+                <a:effectLst/>
+                <a:latin typeface="-apple-system"/>
+              </a:rPr>
+              <a:t>✳️ Swap underlying models or agent architectures easily without impacting core logic.</a:t>
+            </a:r>
+            <a:br>
+              <a:rPr lang="en-US" b="0" i="0" dirty="0">
+                <a:effectLst/>
+                <a:latin typeface="-apple-system"/>
+              </a:rPr>
+            </a:br>
+            <a:r>
+              <a:rPr lang="en-US" b="0" i="0" dirty="0">
+                <a:effectLst/>
+                <a:latin typeface="-apple-system"/>
+              </a:rPr>
+              <a:t>✳️ Integrate performance optimizations within the AI layer.</a:t>
+            </a:r>
+            <a:br>
+              <a:rPr lang="en-US" b="0" i="0" dirty="0">
+                <a:effectLst/>
+                <a:latin typeface="-apple-system"/>
+              </a:rPr>
+            </a:br>
+            <a:r>
+              <a:rPr lang="en-US" b="0" i="0" dirty="0">
+                <a:effectLst/>
+                <a:latin typeface="-apple-system"/>
+              </a:rPr>
+              <a:t>✳️ Adapt quickly to evolving policy and compliance needs.</a:t>
+            </a:r>
+            <a:br>
+              <a:rPr lang="en-US" b="0" i="0" dirty="0">
+                <a:effectLst/>
+                <a:latin typeface="-apple-system"/>
+              </a:rPr>
+            </a:br>
+            <a:r>
+              <a:rPr lang="en-US" b="0" i="0" dirty="0">
+                <a:effectLst/>
+                <a:latin typeface="-apple-system"/>
+              </a:rPr>
+              <a:t>✳️ Accelerate innovation by plugging in new AI advancements seamlessly behind the stable interface.</a:t>
+            </a:r>
+            <a:br>
+              <a:rPr lang="en-US" b="0" i="0" dirty="0">
+                <a:effectLst/>
+                <a:latin typeface="-apple-system"/>
+              </a:rPr>
+            </a:br>
+            <a:br>
+              <a:rPr lang="en-US" b="0" i="0" dirty="0">
+                <a:effectLst/>
+                <a:latin typeface="-apple-system"/>
+              </a:rPr>
+            </a:br>
+            <a:r>
+              <a:rPr lang="en-US" b="0" i="0" dirty="0">
+                <a:effectLst/>
+                <a:latin typeface="-apple-system"/>
+              </a:rPr>
+              <a:t>Designing for abstraction ensures your AI applications are not just functional today, but also resilient, adaptable and easier to evolve in the face of rapidly changing AI technology and requirements.</a:t>
+            </a:r>
+            <a:endParaRPr lang="en-IN" dirty="0"/>
+          </a:p>
+        </p:txBody>
+      </p:sp>
+      <p:sp>
+        <p:nvSpPr>
+          <p:cNvPr id="4" name="Slide Number Placeholder 3"/>
+          <p:cNvSpPr>
+            <a:spLocks noGrp="1"/>
+          </p:cNvSpPr>
+          <p:nvPr>
+            <p:ph type="sldNum" sz="quarter" idx="5"/>
+          </p:nvPr>
+        </p:nvSpPr>
+        <p:spPr/>
+        <p:txBody>
+          <a:bodyPr/>
+          <a:lstStyle/>
+          <a:p>
+            <a:fld id="{36145EA3-E9D9-4AAF-95C8-85BA2B757F37}" type="slidenum">
+              <a:rPr lang="en-IN" smtClean="0"/>
+              <a:t>3</a:t>
+            </a:fld>
+            <a:endParaRPr lang="en-IN"/>
+          </a:p>
+        </p:txBody>
+      </p:sp>
+    </p:spTree>
+    <p:extLst>
+      <p:ext uri="{BB962C8B-B14F-4D97-AF65-F5344CB8AC3E}">
+        <p14:creationId xmlns:p14="http://schemas.microsoft.com/office/powerpoint/2010/main" val="3566442686"/>
+      </p:ext>
+    </p:extLst>
+  </p:cSld>
+  <p:clrMapOvr>
+    <a:masterClrMapping/>
+  </p:clrMapOvr>
+</p:notes>
+</file>
+
+<file path=ppt/notesSlides/notesSlide2.xml><?xml version="1.0" encoding="utf-8"?>
+<p:notes xmlns:a="http://schemas.openxmlformats.org/drawingml/2006/main" xmlns:r="http://schemas.openxmlformats.org/officeDocument/2006/relationships" xmlns:p="http://schemas.openxmlformats.org/presentationml/2006/main">
+  <p:cSld>
+    <p:spTree>
+      <p:nvGrpSpPr>
+        <p:cNvPr id="1" name=""/>
+        <p:cNvGrpSpPr/>
+        <p:nvPr/>
+      </p:nvGrpSpPr>
+      <p:grpSpPr>
+        <a:xfrm>
+          <a:off x="0" y="0"/>
+          <a:ext cx="0" cy="0"/>
+          <a:chOff x="0" y="0"/>
+          <a:chExt cx="0" cy="0"/>
+        </a:xfrm>
+      </p:grpSpPr>
+      <p:sp>
+        <p:nvSpPr>
+          <p:cNvPr id="2" name="Slide Image Placeholder 1"/>
+          <p:cNvSpPr>
+            <a:spLocks noGrp="1" noRot="1" noChangeAspect="1"/>
+          </p:cNvSpPr>
+          <p:nvPr>
+            <p:ph type="sldImg"/>
+          </p:nvPr>
+        </p:nvSpPr>
+        <p:spPr/>
+      </p:sp>
+      <p:sp>
+        <p:nvSpPr>
+          <p:cNvPr id="3" name="Notes Placeholder 2"/>
+          <p:cNvSpPr>
+            <a:spLocks noGrp="1"/>
+          </p:cNvSpPr>
+          <p:nvPr>
+            <p:ph type="body" idx="1"/>
+          </p:nvPr>
+        </p:nvSpPr>
+        <p:spPr/>
+        <p:txBody>
+          <a:bodyPr/>
+          <a:lstStyle/>
+          <a:p>
+            <a:pPr algn="l">
+              <a:lnSpc>
+                <a:spcPts val="1800"/>
+              </a:lnSpc>
+              <a:spcAft>
+                <a:spcPts val="1800"/>
+              </a:spcAft>
+              <a:buNone/>
+            </a:pPr>
+            <a:r>
+              <a:rPr lang="en-US" b="1" i="0" dirty="0">
+                <a:solidFill>
+                  <a:srgbClr val="404040"/>
+                </a:solidFill>
+                <a:effectLst/>
+                <a:latin typeface="Lato" panose="020F0502020204030203" pitchFamily="34" charset="0"/>
+              </a:rPr>
+              <a:t>Infrastructure Complexity</a:t>
+            </a:r>
+            <a:endParaRPr lang="en-US" b="0" i="0" dirty="0">
+              <a:solidFill>
+                <a:srgbClr val="404040"/>
+              </a:solidFill>
+              <a:effectLst/>
+              <a:latin typeface="Lato" panose="020F0502020204030203" pitchFamily="34" charset="0"/>
+            </a:endParaRPr>
+          </a:p>
+          <a:p>
+            <a:pPr algn="l">
+              <a:lnSpc>
+                <a:spcPts val="1800"/>
+              </a:lnSpc>
+              <a:spcAft>
+                <a:spcPts val="1800"/>
+              </a:spcAft>
+              <a:buFont typeface="Arial" panose="020B0604020202020204" pitchFamily="34" charset="0"/>
+              <a:buChar char="•"/>
+            </a:pPr>
+            <a:r>
+              <a:rPr lang="en-US" b="0" i="0" dirty="0">
+                <a:solidFill>
+                  <a:srgbClr val="404040"/>
+                </a:solidFill>
+                <a:effectLst/>
+                <a:latin typeface="Lato" panose="020F0502020204030203" pitchFamily="34" charset="0"/>
+              </a:rPr>
+              <a:t>Running large language models efficiently requires specialized infrastructure.</a:t>
+            </a:r>
+          </a:p>
+          <a:p>
+            <a:pPr algn="l">
+              <a:lnSpc>
+                <a:spcPts val="1800"/>
+              </a:lnSpc>
+              <a:spcAft>
+                <a:spcPts val="1800"/>
+              </a:spcAft>
+              <a:buFont typeface="Arial" panose="020B0604020202020204" pitchFamily="34" charset="0"/>
+              <a:buChar char="•"/>
+            </a:pPr>
+            <a:r>
+              <a:rPr lang="en-US" b="0" i="0" dirty="0">
+                <a:solidFill>
+                  <a:srgbClr val="404040"/>
+                </a:solidFill>
+                <a:effectLst/>
+                <a:latin typeface="Lato" panose="020F0502020204030203" pitchFamily="34" charset="0"/>
+              </a:rPr>
+              <a:t>Different deployment scenarios (local development, cloud, edge) need different solutions.</a:t>
+            </a:r>
+          </a:p>
+          <a:p>
+            <a:pPr algn="l">
+              <a:lnSpc>
+                <a:spcPts val="1800"/>
+              </a:lnSpc>
+              <a:spcAft>
+                <a:spcPts val="1800"/>
+              </a:spcAft>
+              <a:buFont typeface="Arial" panose="020B0604020202020204" pitchFamily="34" charset="0"/>
+              <a:buChar char="•"/>
+            </a:pPr>
+            <a:r>
+              <a:rPr lang="en-US" b="0" i="0" dirty="0">
+                <a:solidFill>
+                  <a:srgbClr val="404040"/>
+                </a:solidFill>
+                <a:effectLst/>
+                <a:latin typeface="Lato" panose="020F0502020204030203" pitchFamily="34" charset="0"/>
+              </a:rPr>
+              <a:t>Moving from development to production often requires significant rework.</a:t>
+            </a:r>
+          </a:p>
+          <a:p>
+            <a:pPr algn="l">
+              <a:lnSpc>
+                <a:spcPts val="1800"/>
+              </a:lnSpc>
+              <a:spcAft>
+                <a:spcPts val="1800"/>
+              </a:spcAft>
+              <a:buNone/>
+            </a:pPr>
+            <a:r>
+              <a:rPr lang="en-US" b="1" i="0" dirty="0">
+                <a:solidFill>
+                  <a:srgbClr val="404040"/>
+                </a:solidFill>
+                <a:effectLst/>
+                <a:latin typeface="Lato" panose="020F0502020204030203" pitchFamily="34" charset="0"/>
+              </a:rPr>
+              <a:t>Essential Capabilities</a:t>
+            </a:r>
+            <a:endParaRPr lang="en-US" b="0" i="0" dirty="0">
+              <a:solidFill>
+                <a:srgbClr val="404040"/>
+              </a:solidFill>
+              <a:effectLst/>
+              <a:latin typeface="Lato" panose="020F0502020204030203" pitchFamily="34" charset="0"/>
+            </a:endParaRPr>
+          </a:p>
+          <a:p>
+            <a:pPr algn="l">
+              <a:lnSpc>
+                <a:spcPts val="1800"/>
+              </a:lnSpc>
+              <a:spcAft>
+                <a:spcPts val="1800"/>
+              </a:spcAft>
+              <a:buFont typeface="Arial" panose="020B0604020202020204" pitchFamily="34" charset="0"/>
+              <a:buChar char="•"/>
+            </a:pPr>
+            <a:r>
+              <a:rPr lang="en-US" b="0" i="0" dirty="0">
+                <a:solidFill>
+                  <a:srgbClr val="404040"/>
+                </a:solidFill>
+                <a:effectLst/>
+                <a:latin typeface="Lato" panose="020F0502020204030203" pitchFamily="34" charset="0"/>
+              </a:rPr>
+              <a:t>Safety guardrails and content filtering are necessary in an enterprise setting.</a:t>
+            </a:r>
+          </a:p>
+          <a:p>
+            <a:pPr algn="l">
+              <a:lnSpc>
+                <a:spcPts val="1800"/>
+              </a:lnSpc>
+              <a:spcAft>
+                <a:spcPts val="1800"/>
+              </a:spcAft>
+              <a:buFont typeface="Arial" panose="020B0604020202020204" pitchFamily="34" charset="0"/>
+              <a:buChar char="•"/>
+            </a:pPr>
+            <a:r>
+              <a:rPr lang="en-US" b="0" i="0" dirty="0">
+                <a:solidFill>
+                  <a:srgbClr val="404040"/>
+                </a:solidFill>
+                <a:effectLst/>
+                <a:latin typeface="Lato" panose="020F0502020204030203" pitchFamily="34" charset="0"/>
+              </a:rPr>
+              <a:t>Just model inference is not enough - Knowledge retrieval and RAG capabilities are required.</a:t>
+            </a:r>
+          </a:p>
+          <a:p>
+            <a:pPr algn="l">
+              <a:lnSpc>
+                <a:spcPts val="1800"/>
+              </a:lnSpc>
+              <a:spcAft>
+                <a:spcPts val="1800"/>
+              </a:spcAft>
+              <a:buFont typeface="Arial" panose="020B0604020202020204" pitchFamily="34" charset="0"/>
+              <a:buChar char="•"/>
+            </a:pPr>
+            <a:r>
+              <a:rPr lang="en-US" b="0" i="0" dirty="0">
+                <a:solidFill>
+                  <a:srgbClr val="404040"/>
+                </a:solidFill>
+                <a:effectLst/>
+                <a:latin typeface="Lato" panose="020F0502020204030203" pitchFamily="34" charset="0"/>
+              </a:rPr>
+              <a:t>Nearly any application needs composable multi-step workflows.</a:t>
+            </a:r>
+          </a:p>
+          <a:p>
+            <a:pPr algn="l">
+              <a:lnSpc>
+                <a:spcPts val="1800"/>
+              </a:lnSpc>
+              <a:spcAft>
+                <a:spcPts val="1800"/>
+              </a:spcAft>
+              <a:buFont typeface="Arial" panose="020B0604020202020204" pitchFamily="34" charset="0"/>
+              <a:buChar char="•"/>
+            </a:pPr>
+            <a:r>
+              <a:rPr lang="en-US" b="0" i="0" dirty="0">
+                <a:solidFill>
+                  <a:srgbClr val="404040"/>
+                </a:solidFill>
+                <a:effectLst/>
+                <a:latin typeface="Lato" panose="020F0502020204030203" pitchFamily="34" charset="0"/>
+              </a:rPr>
+              <a:t>Finally, without monitoring, observability and evaluation, you end up operating in the dark.</a:t>
+            </a:r>
+          </a:p>
+          <a:p>
+            <a:pPr algn="l">
+              <a:lnSpc>
+                <a:spcPts val="1800"/>
+              </a:lnSpc>
+              <a:spcAft>
+                <a:spcPts val="1800"/>
+              </a:spcAft>
+              <a:buNone/>
+            </a:pPr>
+            <a:r>
+              <a:rPr lang="en-US" b="1" i="0" dirty="0">
+                <a:solidFill>
+                  <a:srgbClr val="404040"/>
+                </a:solidFill>
+                <a:effectLst/>
+                <a:latin typeface="Lato" panose="020F0502020204030203" pitchFamily="34" charset="0"/>
+              </a:rPr>
+              <a:t>Lack of Flexibility and Choice</a:t>
+            </a:r>
+            <a:endParaRPr lang="en-US" b="0" i="0" dirty="0">
+              <a:solidFill>
+                <a:srgbClr val="404040"/>
+              </a:solidFill>
+              <a:effectLst/>
+              <a:latin typeface="Lato" panose="020F0502020204030203" pitchFamily="34" charset="0"/>
+            </a:endParaRPr>
+          </a:p>
+          <a:p>
+            <a:pPr algn="l">
+              <a:lnSpc>
+                <a:spcPts val="1800"/>
+              </a:lnSpc>
+              <a:spcAft>
+                <a:spcPts val="1800"/>
+              </a:spcAft>
+              <a:buFont typeface="Arial" panose="020B0604020202020204" pitchFamily="34" charset="0"/>
+              <a:buChar char="•"/>
+            </a:pPr>
+            <a:r>
+              <a:rPr lang="en-US" b="0" i="0" dirty="0">
+                <a:solidFill>
+                  <a:srgbClr val="404040"/>
+                </a:solidFill>
+                <a:effectLst/>
+                <a:latin typeface="Lato" panose="020F0502020204030203" pitchFamily="34" charset="0"/>
+              </a:rPr>
+              <a:t>Directly integrating with multiple providers creates tight coupling.</a:t>
+            </a:r>
+          </a:p>
+          <a:p>
+            <a:pPr algn="l">
+              <a:lnSpc>
+                <a:spcPts val="1800"/>
+              </a:lnSpc>
+              <a:spcAft>
+                <a:spcPts val="1800"/>
+              </a:spcAft>
+              <a:buFont typeface="Arial" panose="020B0604020202020204" pitchFamily="34" charset="0"/>
+              <a:buChar char="•"/>
+            </a:pPr>
+            <a:r>
+              <a:rPr lang="en-US" b="0" i="0" dirty="0">
+                <a:solidFill>
+                  <a:srgbClr val="404040"/>
+                </a:solidFill>
+                <a:effectLst/>
+                <a:latin typeface="Lato" panose="020F0502020204030203" pitchFamily="34" charset="0"/>
+              </a:rPr>
+              <a:t>Different providers have different APIs and abstractions.</a:t>
+            </a:r>
+          </a:p>
+          <a:p>
+            <a:pPr algn="l">
+              <a:lnSpc>
+                <a:spcPts val="1800"/>
+              </a:lnSpc>
+              <a:spcAft>
+                <a:spcPts val="1800"/>
+              </a:spcAft>
+              <a:buFont typeface="Arial" panose="020B0604020202020204" pitchFamily="34" charset="0"/>
+              <a:buChar char="•"/>
+            </a:pPr>
+            <a:r>
+              <a:rPr lang="en-US" b="0" i="0" dirty="0">
+                <a:solidFill>
+                  <a:srgbClr val="404040"/>
+                </a:solidFill>
+                <a:effectLst/>
+                <a:latin typeface="Lato" panose="020F0502020204030203" pitchFamily="34" charset="0"/>
+              </a:rPr>
+              <a:t>Changing providers requires significant code changes.</a:t>
+            </a:r>
+          </a:p>
+          <a:p>
+            <a:endParaRPr lang="en-IN" dirty="0"/>
+          </a:p>
+        </p:txBody>
+      </p:sp>
+      <p:sp>
+        <p:nvSpPr>
+          <p:cNvPr id="4" name="Slide Number Placeholder 3"/>
+          <p:cNvSpPr>
+            <a:spLocks noGrp="1"/>
+          </p:cNvSpPr>
+          <p:nvPr>
+            <p:ph type="sldNum" sz="quarter" idx="5"/>
+          </p:nvPr>
+        </p:nvSpPr>
+        <p:spPr/>
+        <p:txBody>
+          <a:bodyPr/>
+          <a:lstStyle/>
+          <a:p>
+            <a:fld id="{36145EA3-E9D9-4AAF-95C8-85BA2B757F37}" type="slidenum">
+              <a:rPr lang="en-IN" smtClean="0"/>
+              <a:t>4</a:t>
+            </a:fld>
+            <a:endParaRPr lang="en-IN"/>
+          </a:p>
+        </p:txBody>
+      </p:sp>
+    </p:spTree>
+    <p:extLst>
+      <p:ext uri="{BB962C8B-B14F-4D97-AF65-F5344CB8AC3E}">
+        <p14:creationId xmlns:p14="http://schemas.microsoft.com/office/powerpoint/2010/main" val="73722011"/>
+      </p:ext>
+    </p:extLst>
+  </p:cSld>
+  <p:clrMapOvr>
+    <a:masterClrMapping/>
+  </p:clrMapOvr>
+</p:notes>
+</file>
+
+<file path=ppt/notesSlides/notesSlide3.xml><?xml version="1.0" encoding="utf-8"?>
+<p:notes xmlns:a="http://schemas.openxmlformats.org/drawingml/2006/main" xmlns:r="http://schemas.openxmlformats.org/officeDocument/2006/relationships" xmlns:p="http://schemas.openxmlformats.org/presentationml/2006/main">
+  <p:cSld>
+    <p:spTree>
+      <p:nvGrpSpPr>
+        <p:cNvPr id="1" name=""/>
+        <p:cNvGrpSpPr/>
+        <p:nvPr/>
+      </p:nvGrpSpPr>
+      <p:grpSpPr>
+        <a:xfrm>
+          <a:off x="0" y="0"/>
+          <a:ext cx="0" cy="0"/>
+          <a:chOff x="0" y="0"/>
+          <a:chExt cx="0" cy="0"/>
+        </a:xfrm>
+      </p:grpSpPr>
+      <p:sp>
+        <p:nvSpPr>
+          <p:cNvPr id="2" name="Slide Image Placeholder 1"/>
+          <p:cNvSpPr>
+            <a:spLocks noGrp="1" noRot="1" noChangeAspect="1"/>
+          </p:cNvSpPr>
+          <p:nvPr>
+            <p:ph type="sldImg"/>
+          </p:nvPr>
+        </p:nvSpPr>
+        <p:spPr/>
+      </p:sp>
+      <p:sp>
+        <p:nvSpPr>
+          <p:cNvPr id="3" name="Notes Placeholder 2"/>
+          <p:cNvSpPr>
+            <a:spLocks noGrp="1"/>
+          </p:cNvSpPr>
+          <p:nvPr>
+            <p:ph type="body" idx="1"/>
+          </p:nvPr>
+        </p:nvSpPr>
+        <p:spPr/>
+        <p:txBody>
+          <a:bodyPr/>
+          <a:lstStyle/>
+          <a:p>
+            <a:endParaRPr lang="en-IN" dirty="0"/>
+          </a:p>
+        </p:txBody>
+      </p:sp>
+      <p:sp>
+        <p:nvSpPr>
+          <p:cNvPr id="4" name="Slide Number Placeholder 3"/>
+          <p:cNvSpPr>
+            <a:spLocks noGrp="1"/>
+          </p:cNvSpPr>
+          <p:nvPr>
+            <p:ph type="sldNum" sz="quarter" idx="5"/>
+          </p:nvPr>
+        </p:nvSpPr>
+        <p:spPr/>
+        <p:txBody>
+          <a:bodyPr/>
+          <a:lstStyle/>
+          <a:p>
+            <a:fld id="{36145EA3-E9D9-4AAF-95C8-85BA2B757F37}" type="slidenum">
+              <a:rPr lang="en-IN" smtClean="0"/>
+              <a:t>5</a:t>
+            </a:fld>
+            <a:endParaRPr lang="en-IN"/>
+          </a:p>
+        </p:txBody>
+      </p:sp>
+    </p:spTree>
+    <p:extLst>
+      <p:ext uri="{BB962C8B-B14F-4D97-AF65-F5344CB8AC3E}">
+        <p14:creationId xmlns:p14="http://schemas.microsoft.com/office/powerpoint/2010/main" val="3515871944"/>
+      </p:ext>
+    </p:extLst>
+  </p:cSld>
+  <p:clrMapOvr>
+    <a:masterClrMapping/>
+  </p:clrMapOvr>
+</p:notes>
+</file>
+
+<file path=ppt/notesSlides/notesSlide4.xml><?xml version="1.0" encoding="utf-8"?>
+<p:notes xmlns:a="http://schemas.openxmlformats.org/drawingml/2006/main" xmlns:r="http://schemas.openxmlformats.org/officeDocument/2006/relationships" xmlns:p="http://schemas.openxmlformats.org/presentationml/2006/main">
+  <p:cSld>
+    <p:spTree>
+      <p:nvGrpSpPr>
+        <p:cNvPr id="1" name=""/>
+        <p:cNvGrpSpPr/>
+        <p:nvPr/>
+      </p:nvGrpSpPr>
+      <p:grpSpPr>
+        <a:xfrm>
+          <a:off x="0" y="0"/>
+          <a:ext cx="0" cy="0"/>
+          <a:chOff x="0" y="0"/>
+          <a:chExt cx="0" cy="0"/>
+        </a:xfrm>
+      </p:grpSpPr>
+      <p:sp>
+        <p:nvSpPr>
+          <p:cNvPr id="2" name="Slide Image Placeholder 1"/>
+          <p:cNvSpPr>
+            <a:spLocks noGrp="1" noRot="1" noChangeAspect="1"/>
+          </p:cNvSpPr>
+          <p:nvPr>
+            <p:ph type="sldImg"/>
+          </p:nvPr>
+        </p:nvSpPr>
+        <p:spPr/>
+      </p:sp>
+      <p:sp>
+        <p:nvSpPr>
+          <p:cNvPr id="3" name="Notes Placeholder 2"/>
+          <p:cNvSpPr>
+            <a:spLocks noGrp="1"/>
+          </p:cNvSpPr>
+          <p:nvPr>
+            <p:ph type="body" idx="1"/>
+          </p:nvPr>
+        </p:nvSpPr>
+        <p:spPr/>
+        <p:txBody>
+          <a:bodyPr/>
+          <a:lstStyle/>
+          <a:p>
+            <a:pPr>
+              <a:lnSpc>
+                <a:spcPts val="1800"/>
+              </a:lnSpc>
+              <a:spcAft>
+                <a:spcPts val="1800"/>
+              </a:spcAft>
+              <a:buNone/>
+            </a:pPr>
+            <a:r>
+              <a:rPr lang="en-US" dirty="0">
+                <a:effectLst/>
+              </a:rPr>
+              <a:t>Llama Stack addresses these challenges through a service-oriented, API-first approach:</a:t>
+            </a:r>
+          </a:p>
+          <a:p>
+            <a:pPr>
+              <a:lnSpc>
+                <a:spcPts val="1800"/>
+              </a:lnSpc>
+              <a:spcAft>
+                <a:spcPts val="1800"/>
+              </a:spcAft>
+              <a:buNone/>
+            </a:pPr>
+            <a:r>
+              <a:rPr lang="en-US" b="1" dirty="0">
+                <a:effectLst/>
+              </a:rPr>
+              <a:t>Develop Anywhere, Deploy Everywhere</a:t>
+            </a:r>
+            <a:endParaRPr lang="en-US" dirty="0">
+              <a:effectLst/>
+            </a:endParaRPr>
+          </a:p>
+          <a:p>
+            <a:pPr>
+              <a:lnSpc>
+                <a:spcPts val="1800"/>
+              </a:lnSpc>
+              <a:spcAft>
+                <a:spcPts val="1800"/>
+              </a:spcAft>
+              <a:buFont typeface="Arial" panose="020B0604020202020204" pitchFamily="34" charset="0"/>
+              <a:buChar char="•"/>
+            </a:pPr>
+            <a:r>
+              <a:rPr lang="en-US" dirty="0">
+                <a:effectLst/>
+              </a:rPr>
+              <a:t>Start locally with CPU-only setups</a:t>
+            </a:r>
+          </a:p>
+          <a:p>
+            <a:pPr>
+              <a:lnSpc>
+                <a:spcPts val="1800"/>
+              </a:lnSpc>
+              <a:spcAft>
+                <a:spcPts val="1800"/>
+              </a:spcAft>
+              <a:buFont typeface="Arial" panose="020B0604020202020204" pitchFamily="34" charset="0"/>
+              <a:buChar char="•"/>
+            </a:pPr>
+            <a:r>
+              <a:rPr lang="en-US" dirty="0">
+                <a:effectLst/>
+              </a:rPr>
+              <a:t>Move to GPU acceleration when needed</a:t>
+            </a:r>
+          </a:p>
+          <a:p>
+            <a:pPr>
+              <a:lnSpc>
+                <a:spcPts val="1800"/>
+              </a:lnSpc>
+              <a:spcAft>
+                <a:spcPts val="1800"/>
+              </a:spcAft>
+              <a:buFont typeface="Arial" panose="020B0604020202020204" pitchFamily="34" charset="0"/>
+              <a:buChar char="•"/>
+            </a:pPr>
+            <a:r>
+              <a:rPr lang="en-US" dirty="0">
+                <a:effectLst/>
+              </a:rPr>
+              <a:t>Deploy to cloud or edge without code changes</a:t>
+            </a:r>
+          </a:p>
+          <a:p>
+            <a:pPr>
+              <a:lnSpc>
+                <a:spcPts val="1800"/>
+              </a:lnSpc>
+              <a:spcAft>
+                <a:spcPts val="1800"/>
+              </a:spcAft>
+              <a:buFont typeface="Arial" panose="020B0604020202020204" pitchFamily="34" charset="0"/>
+              <a:buChar char="•"/>
+            </a:pPr>
+            <a:r>
+              <a:rPr lang="en-US" dirty="0">
+                <a:effectLst/>
+              </a:rPr>
+              <a:t>Same APIs and developer experience everywhere</a:t>
+            </a:r>
+          </a:p>
+          <a:p>
+            <a:pPr>
+              <a:lnSpc>
+                <a:spcPts val="1800"/>
+              </a:lnSpc>
+              <a:spcAft>
+                <a:spcPts val="1800"/>
+              </a:spcAft>
+              <a:buNone/>
+            </a:pPr>
+            <a:r>
+              <a:rPr lang="en-US" b="1" dirty="0">
+                <a:effectLst/>
+              </a:rPr>
+              <a:t>Production-Ready Building Blocks</a:t>
+            </a:r>
+            <a:endParaRPr lang="en-US" dirty="0">
+              <a:effectLst/>
+            </a:endParaRPr>
+          </a:p>
+          <a:p>
+            <a:pPr>
+              <a:lnSpc>
+                <a:spcPts val="1800"/>
+              </a:lnSpc>
+              <a:spcAft>
+                <a:spcPts val="1800"/>
+              </a:spcAft>
+              <a:buFont typeface="Arial" panose="020B0604020202020204" pitchFamily="34" charset="0"/>
+              <a:buChar char="•"/>
+            </a:pPr>
+            <a:r>
+              <a:rPr lang="en-US" dirty="0">
+                <a:effectLst/>
+              </a:rPr>
+              <a:t>Pre-built safety guardrails and content filtering</a:t>
+            </a:r>
+          </a:p>
+          <a:p>
+            <a:pPr>
+              <a:lnSpc>
+                <a:spcPts val="1800"/>
+              </a:lnSpc>
+              <a:spcAft>
+                <a:spcPts val="1800"/>
+              </a:spcAft>
+              <a:buFont typeface="Arial" panose="020B0604020202020204" pitchFamily="34" charset="0"/>
+              <a:buChar char="•"/>
+            </a:pPr>
+            <a:r>
+              <a:rPr lang="en-US" dirty="0">
+                <a:effectLst/>
+              </a:rPr>
+              <a:t>Built-in RAG and agent capabilities</a:t>
+            </a:r>
+          </a:p>
+          <a:p>
+            <a:pPr>
+              <a:lnSpc>
+                <a:spcPts val="1800"/>
+              </a:lnSpc>
+              <a:spcAft>
+                <a:spcPts val="1800"/>
+              </a:spcAft>
+              <a:buFont typeface="Arial" panose="020B0604020202020204" pitchFamily="34" charset="0"/>
+              <a:buChar char="•"/>
+            </a:pPr>
+            <a:r>
+              <a:rPr lang="en-US" dirty="0">
+                <a:effectLst/>
+              </a:rPr>
+              <a:t>Comprehensive evaluation toolkit</a:t>
+            </a:r>
+          </a:p>
+          <a:p>
+            <a:pPr>
+              <a:lnSpc>
+                <a:spcPts val="1800"/>
+              </a:lnSpc>
+              <a:spcAft>
+                <a:spcPts val="1800"/>
+              </a:spcAft>
+              <a:buFont typeface="Arial" panose="020B0604020202020204" pitchFamily="34" charset="0"/>
+              <a:buChar char="•"/>
+            </a:pPr>
+            <a:r>
+              <a:rPr lang="en-US" dirty="0">
+                <a:effectLst/>
+              </a:rPr>
+              <a:t>Full observability and monitoring</a:t>
+            </a:r>
+          </a:p>
+          <a:p>
+            <a:pPr>
+              <a:lnSpc>
+                <a:spcPts val="1800"/>
+              </a:lnSpc>
+              <a:spcAft>
+                <a:spcPts val="1800"/>
+              </a:spcAft>
+              <a:buNone/>
+            </a:pPr>
+            <a:r>
+              <a:rPr lang="en-US" b="1" dirty="0">
+                <a:effectLst/>
+              </a:rPr>
+              <a:t>True Provider Independence</a:t>
+            </a:r>
+            <a:endParaRPr lang="en-US" dirty="0">
+              <a:effectLst/>
+            </a:endParaRPr>
+          </a:p>
+          <a:p>
+            <a:pPr>
+              <a:lnSpc>
+                <a:spcPts val="1800"/>
+              </a:lnSpc>
+              <a:spcAft>
+                <a:spcPts val="1800"/>
+              </a:spcAft>
+              <a:buFont typeface="Arial" panose="020B0604020202020204" pitchFamily="34" charset="0"/>
+              <a:buChar char="•"/>
+            </a:pPr>
+            <a:r>
+              <a:rPr lang="en-US" dirty="0">
+                <a:effectLst/>
+              </a:rPr>
+              <a:t>Swap providers without application changes</a:t>
+            </a:r>
+          </a:p>
+          <a:p>
+            <a:pPr>
+              <a:lnSpc>
+                <a:spcPts val="1800"/>
+              </a:lnSpc>
+              <a:spcAft>
+                <a:spcPts val="1800"/>
+              </a:spcAft>
+              <a:buFont typeface="Arial" panose="020B0604020202020204" pitchFamily="34" charset="0"/>
+              <a:buChar char="•"/>
+            </a:pPr>
+            <a:r>
+              <a:rPr lang="en-US" dirty="0">
+                <a:effectLst/>
+              </a:rPr>
+              <a:t>Mix and match best-in-class implementations</a:t>
+            </a:r>
+          </a:p>
+          <a:p>
+            <a:pPr>
+              <a:lnSpc>
+                <a:spcPts val="1800"/>
+              </a:lnSpc>
+              <a:spcAft>
+                <a:spcPts val="1800"/>
+              </a:spcAft>
+              <a:buFont typeface="Arial" panose="020B0604020202020204" pitchFamily="34" charset="0"/>
+              <a:buChar char="•"/>
+            </a:pPr>
+            <a:r>
+              <a:rPr lang="en-US" dirty="0">
+                <a:effectLst/>
+              </a:rPr>
+              <a:t>Federation and fallback support</a:t>
+            </a:r>
+          </a:p>
+          <a:p>
+            <a:pPr>
+              <a:lnSpc>
+                <a:spcPts val="1800"/>
+              </a:lnSpc>
+              <a:spcAft>
+                <a:spcPts val="1800"/>
+              </a:spcAft>
+              <a:buFont typeface="Arial" panose="020B0604020202020204" pitchFamily="34" charset="0"/>
+              <a:buChar char="•"/>
+            </a:pPr>
+            <a:r>
+              <a:rPr lang="en-US" dirty="0">
+                <a:effectLst/>
+              </a:rPr>
+              <a:t>No vendor lock-in</a:t>
+            </a:r>
+          </a:p>
+          <a:p>
+            <a:pPr>
+              <a:lnSpc>
+                <a:spcPts val="1800"/>
+              </a:lnSpc>
+              <a:spcAft>
+                <a:spcPts val="1800"/>
+              </a:spcAft>
+              <a:buNone/>
+            </a:pPr>
+            <a:r>
+              <a:rPr lang="en-US" b="1" dirty="0">
+                <a:effectLst/>
+              </a:rPr>
+              <a:t>Robust Ecosystem</a:t>
+            </a:r>
+            <a:endParaRPr lang="en-US" dirty="0">
+              <a:effectLst/>
+            </a:endParaRPr>
+          </a:p>
+          <a:p>
+            <a:pPr>
+              <a:lnSpc>
+                <a:spcPts val="1800"/>
+              </a:lnSpc>
+              <a:spcAft>
+                <a:spcPts val="1800"/>
+              </a:spcAft>
+              <a:buFont typeface="Arial" panose="020B0604020202020204" pitchFamily="34" charset="0"/>
+              <a:buChar char="•"/>
+            </a:pPr>
+            <a:r>
+              <a:rPr lang="en-US" dirty="0">
+                <a:effectLst/>
+              </a:rPr>
+              <a:t>Llama Stack is already integrated with distribution partners (cloud providers, hardware vendors, and AI-focused companies).</a:t>
+            </a:r>
+          </a:p>
+          <a:p>
+            <a:pPr>
+              <a:lnSpc>
+                <a:spcPts val="1800"/>
+              </a:lnSpc>
+              <a:spcAft>
+                <a:spcPts val="1800"/>
+              </a:spcAft>
+              <a:buFont typeface="Arial" panose="020B0604020202020204" pitchFamily="34" charset="0"/>
+              <a:buChar char="•"/>
+            </a:pPr>
+            <a:r>
+              <a:rPr lang="en-US" dirty="0">
+                <a:effectLst/>
+              </a:rPr>
+              <a:t>Ecosystem offers tailored infrastructure, software, and services for deploying a variety of models.</a:t>
+            </a:r>
+          </a:p>
+          <a:p>
+            <a:pPr>
+              <a:lnSpc>
+                <a:spcPts val="1800"/>
+              </a:lnSpc>
+              <a:spcAft>
+                <a:spcPts val="1800"/>
+              </a:spcAft>
+              <a:buFont typeface="Arial" panose="020B0604020202020204" pitchFamily="34" charset="0"/>
+              <a:buChar char="•"/>
+            </a:pPr>
+            <a:endParaRPr lang="en-US" dirty="0">
+              <a:effectLst/>
+            </a:endParaRPr>
+          </a:p>
+          <a:p>
+            <a:pPr>
+              <a:spcAft>
+                <a:spcPts val="1800"/>
+              </a:spcAft>
+              <a:buNone/>
+            </a:pPr>
+            <a:r>
+              <a:rPr lang="en-US" b="0" dirty="0">
+                <a:effectLst/>
+                <a:latin typeface="Roboto Slab" panose="020F0502020204030204" pitchFamily="2" charset="0"/>
+              </a:rPr>
+              <a:t>Our Philosophy</a:t>
+            </a:r>
+            <a:r>
+              <a:rPr lang="en-US" b="0" u="none" strike="noStrike" dirty="0">
+                <a:solidFill>
+                  <a:srgbClr val="2980B9"/>
+                </a:solidFill>
+                <a:effectLst/>
+                <a:latin typeface="FontAwesome"/>
+                <a:hlinkClick r:id="rId3" tooltip="Link to this heading"/>
+              </a:rPr>
+              <a:t></a:t>
+            </a:r>
+            <a:endParaRPr lang="en-US" b="0" dirty="0">
+              <a:effectLst/>
+              <a:latin typeface="Roboto Slab" panose="020F0502020204030204" pitchFamily="2" charset="0"/>
+            </a:endParaRPr>
+          </a:p>
+          <a:p>
+            <a:pPr>
+              <a:lnSpc>
+                <a:spcPts val="1800"/>
+              </a:lnSpc>
+              <a:spcAft>
+                <a:spcPts val="1800"/>
+              </a:spcAft>
+              <a:buFont typeface="Arial" panose="020B0604020202020204" pitchFamily="34" charset="0"/>
+              <a:buChar char="•"/>
+            </a:pPr>
+            <a:r>
+              <a:rPr lang="en-US" b="1" dirty="0">
+                <a:effectLst/>
+              </a:rPr>
+              <a:t>Service-Oriented</a:t>
+            </a:r>
+            <a:r>
+              <a:rPr lang="en-US" dirty="0">
+                <a:effectLst/>
+              </a:rPr>
+              <a:t>: REST APIs enforce clean interfaces and enable seamless transitions across different environments.</a:t>
+            </a:r>
+          </a:p>
+          <a:p>
+            <a:pPr>
+              <a:lnSpc>
+                <a:spcPts val="1800"/>
+              </a:lnSpc>
+              <a:spcAft>
+                <a:spcPts val="1800"/>
+              </a:spcAft>
+              <a:buFont typeface="Arial" panose="020B0604020202020204" pitchFamily="34" charset="0"/>
+              <a:buChar char="•"/>
+            </a:pPr>
+            <a:r>
+              <a:rPr lang="en-US" b="1" dirty="0">
+                <a:effectLst/>
+              </a:rPr>
+              <a:t>Composability</a:t>
+            </a:r>
+            <a:r>
+              <a:rPr lang="en-US" dirty="0">
+                <a:effectLst/>
+              </a:rPr>
+              <a:t>: Every component is independent but works together seamlessly</a:t>
+            </a:r>
+          </a:p>
+          <a:p>
+            <a:pPr>
+              <a:lnSpc>
+                <a:spcPts val="1800"/>
+              </a:lnSpc>
+              <a:spcAft>
+                <a:spcPts val="1800"/>
+              </a:spcAft>
+              <a:buFont typeface="Arial" panose="020B0604020202020204" pitchFamily="34" charset="0"/>
+              <a:buChar char="•"/>
+            </a:pPr>
+            <a:r>
+              <a:rPr lang="en-US" b="1" dirty="0">
+                <a:effectLst/>
+              </a:rPr>
+              <a:t>Production Ready</a:t>
+            </a:r>
+            <a:r>
+              <a:rPr lang="en-US" dirty="0">
+                <a:effectLst/>
+              </a:rPr>
+              <a:t>: Built for real-world applications, not just demos</a:t>
+            </a:r>
+          </a:p>
+          <a:p>
+            <a:pPr>
+              <a:lnSpc>
+                <a:spcPts val="1800"/>
+              </a:lnSpc>
+              <a:spcAft>
+                <a:spcPts val="1800"/>
+              </a:spcAft>
+              <a:buFont typeface="Arial" panose="020B0604020202020204" pitchFamily="34" charset="0"/>
+              <a:buChar char="•"/>
+            </a:pPr>
+            <a:r>
+              <a:rPr lang="en-US" b="1" dirty="0">
+                <a:effectLst/>
+              </a:rPr>
+              <a:t>Turnkey Solutions</a:t>
+            </a:r>
+            <a:r>
+              <a:rPr lang="en-US" dirty="0">
+                <a:effectLst/>
+              </a:rPr>
+              <a:t>: Easy to deploy built in solutions for popular deployment scenarios</a:t>
+            </a:r>
+          </a:p>
+          <a:p>
+            <a:pPr>
+              <a:lnSpc>
+                <a:spcPts val="1800"/>
+              </a:lnSpc>
+              <a:spcAft>
+                <a:spcPts val="1800"/>
+              </a:spcAft>
+            </a:pPr>
+            <a:r>
+              <a:rPr lang="en-US" dirty="0">
+                <a:effectLst/>
+              </a:rPr>
+              <a:t>With Llama Stack, you can focus on building your application while we handle the infrastructure complexity, essential capabilities, and provider integrations.</a:t>
+            </a:r>
+          </a:p>
+          <a:p>
+            <a:endParaRPr lang="en-IN" dirty="0"/>
+          </a:p>
+          <a:p>
+            <a:endParaRPr lang="en-IN" dirty="0"/>
+          </a:p>
+        </p:txBody>
+      </p:sp>
+      <p:sp>
+        <p:nvSpPr>
+          <p:cNvPr id="4" name="Slide Number Placeholder 3"/>
+          <p:cNvSpPr>
+            <a:spLocks noGrp="1"/>
+          </p:cNvSpPr>
+          <p:nvPr>
+            <p:ph type="sldNum" sz="quarter" idx="5"/>
+          </p:nvPr>
+        </p:nvSpPr>
+        <p:spPr/>
+        <p:txBody>
+          <a:bodyPr/>
+          <a:lstStyle/>
+          <a:p>
+            <a:fld id="{36145EA3-E9D9-4AAF-95C8-85BA2B757F37}" type="slidenum">
+              <a:rPr lang="en-IN" smtClean="0"/>
+              <a:t>6</a:t>
+            </a:fld>
+            <a:endParaRPr lang="en-IN"/>
+          </a:p>
+        </p:txBody>
+      </p:sp>
+    </p:spTree>
+    <p:extLst>
+      <p:ext uri="{BB962C8B-B14F-4D97-AF65-F5344CB8AC3E}">
+        <p14:creationId xmlns:p14="http://schemas.microsoft.com/office/powerpoint/2010/main" val="3349091213"/>
+      </p:ext>
+    </p:extLst>
+  </p:cSld>
+  <p:clrMapOvr>
+    <a:masterClrMapping/>
+  </p:clrMapOvr>
+</p:notes>
+</file>
+
 <file path=ppt/slideLayouts/slideLayout1.xml><?xml version="1.0" encoding="utf-8"?>
 <p:sldLayout xmlns:a="http://schemas.openxmlformats.org/drawingml/2006/main" xmlns:r="http://schemas.openxmlformats.org/officeDocument/2006/relationships" xmlns:p="http://schemas.openxmlformats.org/presentationml/2006/main" preserve="1" userDrawn="1">
   <p:cSld name="Front">
@@ -6508,7 +8204,7 @@
           <a:p>
             <a:fld id="{8A4A55F2-D73A-40B9-A52A-05A49C1341AC}" type="datetimeFigureOut">
               <a:rPr lang="en-IN" smtClean="0"/>
-              <a:t>09-05-2025</a:t>
+              <a:t>10-05-2025</a:t>
             </a:fld>
             <a:endParaRPr lang="en-IN"/>
           </a:p>
@@ -6949,10 +8645,54 @@
           <a:chExt cx="0" cy="0"/>
         </a:xfrm>
       </p:grpSpPr>
+      <p:sp>
+        <p:nvSpPr>
+          <p:cNvPr id="2" name="TextBox 1">
+            <a:extLst>
+              <a:ext uri="{FF2B5EF4-FFF2-40B4-BE49-F238E27FC236}">
+                <a16:creationId xmlns:a16="http://schemas.microsoft.com/office/drawing/2014/main" id="{8CDFA69C-7B27-CDE7-F9A0-024FA9521B52}"/>
+              </a:ext>
+            </a:extLst>
+          </p:cNvPr>
+          <p:cNvSpPr txBox="1"/>
+          <p:nvPr/>
+        </p:nvSpPr>
+        <p:spPr>
+          <a:xfrm>
+            <a:off x="542440" y="2505670"/>
+            <a:ext cx="1874231" cy="923330"/>
+          </a:xfrm>
+          <a:prstGeom prst="rect">
+            <a:avLst/>
+          </a:prstGeom>
+          <a:noFill/>
+        </p:spPr>
+        <p:txBody>
+          <a:bodyPr wrap="none" rtlCol="0">
+            <a:spAutoFit/>
+          </a:bodyPr>
+          <a:lstStyle/>
+          <a:p>
+            <a:r>
+              <a:rPr lang="en-US" sz="5400" dirty="0">
+                <a:solidFill>
+                  <a:schemeClr val="bg1"/>
+                </a:solidFill>
+              </a:rPr>
+              <a:t>Demo</a:t>
+            </a:r>
+            <a:endParaRPr lang="en-IN" sz="5400" dirty="0">
+              <a:solidFill>
+                <a:schemeClr val="bg1"/>
+              </a:solidFill>
+            </a:endParaRPr>
+          </a:p>
+        </p:txBody>
+      </p:sp>
     </p:spTree>
     <p:extLst>
       <p:ext uri="{BB962C8B-B14F-4D97-AF65-F5344CB8AC3E}">
-        <p14:creationId xmlns:p14="http://schemas.microsoft.com/office/powerpoint/2010/main" val="4288126697"/>
+        <p14:creationId xmlns:p14="http://schemas.microsoft.com/office/powerpoint/2010/main" val="2087009837"/>
       </p:ext>
     </p:extLst>
   </p:cSld>
@@ -6979,792 +8719,10 @@
           <a:chExt cx="0" cy="0"/>
         </a:xfrm>
       </p:grpSpPr>
-      <p:pic>
-        <p:nvPicPr>
-          <p:cNvPr id="2" name="Picture 1">
-            <a:extLst>
-              <a:ext uri="{FF2B5EF4-FFF2-40B4-BE49-F238E27FC236}">
-                <a16:creationId xmlns:a16="http://schemas.microsoft.com/office/drawing/2014/main" id="{5BA905F9-37B2-580B-4505-11E3CFFD23BF}"/>
-              </a:ext>
-            </a:extLst>
-          </p:cNvPr>
-          <p:cNvPicPr>
-            <a:picLocks noChangeAspect="1"/>
-          </p:cNvPicPr>
-          <p:nvPr/>
-        </p:nvPicPr>
-        <p:blipFill rotWithShape="1">
-          <a:blip r:embed="rId2">
-            <a:extLst>
-              <a:ext uri="{28A0092B-C50C-407E-A947-70E740481C1C}">
-                <a14:useLocalDpi xmlns:a14="http://schemas.microsoft.com/office/drawing/2010/main" val="0"/>
-              </a:ext>
-            </a:extLst>
-          </a:blip>
-          <a:srcRect/>
-          <a:stretch/>
-        </p:blipFill>
-        <p:spPr>
-          <a:xfrm>
-            <a:off x="7839547" y="1229405"/>
-            <a:ext cx="3287506" cy="3287506"/>
-          </a:xfrm>
-          <a:custGeom>
-            <a:avLst/>
-            <a:gdLst/>
-            <a:ahLst/>
-            <a:cxnLst/>
-            <a:rect l="l" t="t" r="r" b="b"/>
-            <a:pathLst>
-              <a:path w="1838528" h="1838528">
-                <a:moveTo>
-                  <a:pt x="919264" y="0"/>
-                </a:moveTo>
-                <a:cubicBezTo>
-                  <a:pt x="1426959" y="0"/>
-                  <a:pt x="1838528" y="411569"/>
-                  <a:pt x="1838528" y="919264"/>
-                </a:cubicBezTo>
-                <a:cubicBezTo>
-                  <a:pt x="1838528" y="1426959"/>
-                  <a:pt x="1426959" y="1838528"/>
-                  <a:pt x="919264" y="1838528"/>
-                </a:cubicBezTo>
-                <a:cubicBezTo>
-                  <a:pt x="411569" y="1838528"/>
-                  <a:pt x="0" y="1426959"/>
-                  <a:pt x="0" y="919264"/>
-                </a:cubicBezTo>
-                <a:cubicBezTo>
-                  <a:pt x="0" y="411569"/>
-                  <a:pt x="411569" y="0"/>
-                  <a:pt x="919264" y="0"/>
-                </a:cubicBezTo>
-                <a:close/>
-              </a:path>
-            </a:pathLst>
-          </a:custGeom>
-        </p:spPr>
-      </p:pic>
-      <p:sp>
-        <p:nvSpPr>
-          <p:cNvPr id="3" name="Content Placeholder 4">
-            <a:extLst>
-              <a:ext uri="{FF2B5EF4-FFF2-40B4-BE49-F238E27FC236}">
-                <a16:creationId xmlns:a16="http://schemas.microsoft.com/office/drawing/2014/main" id="{3D8D9CB8-80A0-08CB-324F-DBED010E1483}"/>
-              </a:ext>
-            </a:extLst>
-          </p:cNvPr>
-          <p:cNvSpPr txBox="1">
-            <a:spLocks/>
-          </p:cNvSpPr>
-          <p:nvPr/>
-        </p:nvSpPr>
-        <p:spPr>
-          <a:xfrm>
-            <a:off x="8211529" y="4722638"/>
-            <a:ext cx="2870053" cy="404290"/>
-          </a:xfrm>
-          <a:prstGeom prst="rect">
-            <a:avLst/>
-          </a:prstGeom>
-        </p:spPr>
-        <p:txBody>
-          <a:bodyPr vert="horz" lIns="91440" tIns="45720" rIns="91440" bIns="45720" rtlCol="0">
-            <a:noAutofit/>
-          </a:bodyPr>
-          <a:lstStyle>
-            <a:lvl1pPr marL="228600" indent="-228600" algn="l" defTabSz="914400" rtl="0" eaLnBrk="1" latinLnBrk="0" hangingPunct="1">
-              <a:lnSpc>
-                <a:spcPct val="90000"/>
-              </a:lnSpc>
-              <a:spcBef>
-                <a:spcPts val="1000"/>
-              </a:spcBef>
-              <a:buFont typeface="Arial" panose="020B0604020202020204" pitchFamily="34" charset="0"/>
-              <a:buChar char="•"/>
-              <a:defRPr lang="en-US" sz="2200" kern="1200" dirty="0" smtClean="0">
-                <a:solidFill>
-                  <a:schemeClr val="tx1"/>
-                </a:solidFill>
-                <a:latin typeface="+mn-lt"/>
-                <a:ea typeface="+mn-ea"/>
-                <a:cs typeface="+mn-cs"/>
-              </a:defRPr>
-            </a:lvl1pPr>
-            <a:lvl2pPr marL="685800" indent="-228600" algn="l" defTabSz="914400" rtl="0" eaLnBrk="1" latinLnBrk="0" hangingPunct="1">
-              <a:lnSpc>
-                <a:spcPct val="90000"/>
-              </a:lnSpc>
-              <a:spcBef>
-                <a:spcPts val="500"/>
-              </a:spcBef>
-              <a:buFont typeface="Arial" panose="020B0604020202020204" pitchFamily="34" charset="0"/>
-              <a:buChar char="•"/>
-              <a:defRPr sz="1800" kern="1200">
-                <a:solidFill>
-                  <a:schemeClr val="tx1"/>
-                </a:solidFill>
-                <a:latin typeface="+mn-lt"/>
-                <a:ea typeface="+mn-ea"/>
-                <a:cs typeface="+mn-cs"/>
-              </a:defRPr>
-            </a:lvl2pPr>
-            <a:lvl3pPr marL="1143000" indent="-228600" algn="l" defTabSz="914400" rtl="0" eaLnBrk="1" latinLnBrk="0" hangingPunct="1">
-              <a:lnSpc>
-                <a:spcPct val="90000"/>
-              </a:lnSpc>
-              <a:spcBef>
-                <a:spcPts val="500"/>
-              </a:spcBef>
-              <a:buFont typeface="Arial" panose="020B0604020202020204" pitchFamily="34" charset="0"/>
-              <a:buChar char="•"/>
-              <a:defRPr sz="1500" kern="1200">
-                <a:solidFill>
-                  <a:schemeClr val="tx1"/>
-                </a:solidFill>
-                <a:latin typeface="+mn-lt"/>
-                <a:ea typeface="+mn-ea"/>
-                <a:cs typeface="+mn-cs"/>
-              </a:defRPr>
-            </a:lvl3pPr>
-            <a:lvl4pPr marL="1600200" indent="-228600" algn="l" defTabSz="914400" rtl="0" eaLnBrk="1" latinLnBrk="0" hangingPunct="1">
-              <a:lnSpc>
-                <a:spcPct val="90000"/>
-              </a:lnSpc>
-              <a:spcBef>
-                <a:spcPts val="500"/>
-              </a:spcBef>
-              <a:buFont typeface="Arial" panose="020B0604020202020204" pitchFamily="34" charset="0"/>
-              <a:buChar char="•"/>
-              <a:defRPr sz="1800" kern="1200">
-                <a:solidFill>
-                  <a:schemeClr val="tx1"/>
-                </a:solidFill>
-                <a:latin typeface="+mn-lt"/>
-                <a:ea typeface="+mn-ea"/>
-                <a:cs typeface="+mn-cs"/>
-              </a:defRPr>
-            </a:lvl4pPr>
-            <a:lvl5pPr marL="2057400" indent="-228600" algn="l" defTabSz="914400" rtl="0" eaLnBrk="1" latinLnBrk="0" hangingPunct="1">
-              <a:lnSpc>
-                <a:spcPct val="90000"/>
-              </a:lnSpc>
-              <a:spcBef>
-                <a:spcPts val="500"/>
-              </a:spcBef>
-              <a:buFont typeface="Arial" panose="020B0604020202020204" pitchFamily="34" charset="0"/>
-              <a:buChar char="•"/>
-              <a:defRPr sz="1800" kern="1200">
-                <a:solidFill>
-                  <a:schemeClr val="tx1"/>
-                </a:solidFill>
-                <a:latin typeface="+mn-lt"/>
-                <a:ea typeface="+mn-ea"/>
-                <a:cs typeface="+mn-cs"/>
-              </a:defRPr>
-            </a:lvl5pPr>
-            <a:lvl6pPr marL="2514600" indent="-228600" algn="l" defTabSz="914400" rtl="0" eaLnBrk="1" latinLnBrk="0" hangingPunct="1">
-              <a:lnSpc>
-                <a:spcPct val="90000"/>
-              </a:lnSpc>
-              <a:spcBef>
-                <a:spcPts val="500"/>
-              </a:spcBef>
-              <a:buFont typeface="Arial" panose="020B0604020202020204" pitchFamily="34" charset="0"/>
-              <a:buChar char="•"/>
-              <a:defRPr sz="1800" kern="1200">
-                <a:solidFill>
-                  <a:schemeClr val="tx1"/>
-                </a:solidFill>
-                <a:latin typeface="+mn-lt"/>
-                <a:ea typeface="+mn-ea"/>
-                <a:cs typeface="+mn-cs"/>
-              </a:defRPr>
-            </a:lvl6pPr>
-            <a:lvl7pPr marL="2971800" indent="-228600" algn="l" defTabSz="914400" rtl="0" eaLnBrk="1" latinLnBrk="0" hangingPunct="1">
-              <a:lnSpc>
-                <a:spcPct val="90000"/>
-              </a:lnSpc>
-              <a:spcBef>
-                <a:spcPts val="500"/>
-              </a:spcBef>
-              <a:buFont typeface="Arial" panose="020B0604020202020204" pitchFamily="34" charset="0"/>
-              <a:buChar char="•"/>
-              <a:defRPr sz="1800" kern="1200">
-                <a:solidFill>
-                  <a:schemeClr val="tx1"/>
-                </a:solidFill>
-                <a:latin typeface="+mn-lt"/>
-                <a:ea typeface="+mn-ea"/>
-                <a:cs typeface="+mn-cs"/>
-              </a:defRPr>
-            </a:lvl7pPr>
-            <a:lvl8pPr marL="3429000" indent="-228600" algn="l" defTabSz="914400" rtl="0" eaLnBrk="1" latinLnBrk="0" hangingPunct="1">
-              <a:lnSpc>
-                <a:spcPct val="90000"/>
-              </a:lnSpc>
-              <a:spcBef>
-                <a:spcPts val="500"/>
-              </a:spcBef>
-              <a:buFont typeface="Arial" panose="020B0604020202020204" pitchFamily="34" charset="0"/>
-              <a:buChar char="•"/>
-              <a:defRPr sz="1800" kern="1200">
-                <a:solidFill>
-                  <a:schemeClr val="tx1"/>
-                </a:solidFill>
-                <a:latin typeface="+mn-lt"/>
-                <a:ea typeface="+mn-ea"/>
-                <a:cs typeface="+mn-cs"/>
-              </a:defRPr>
-            </a:lvl8pPr>
-            <a:lvl9pPr marL="3886200" indent="-228600" algn="l" defTabSz="914400" rtl="0" eaLnBrk="1" latinLnBrk="0" hangingPunct="1">
-              <a:lnSpc>
-                <a:spcPct val="90000"/>
-              </a:lnSpc>
-              <a:spcBef>
-                <a:spcPts val="500"/>
-              </a:spcBef>
-              <a:buFont typeface="Arial" panose="020B0604020202020204" pitchFamily="34" charset="0"/>
-              <a:buChar char="•"/>
-              <a:defRPr sz="1800" kern="1200">
-                <a:solidFill>
-                  <a:schemeClr val="tx1"/>
-                </a:solidFill>
-                <a:latin typeface="+mn-lt"/>
-                <a:ea typeface="+mn-ea"/>
-                <a:cs typeface="+mn-cs"/>
-              </a:defRPr>
-            </a:lvl9pPr>
-          </a:lstStyle>
-          <a:p>
-            <a:pPr marL="0" indent="0" algn="ctr">
-              <a:lnSpc>
-                <a:spcPct val="100000"/>
-              </a:lnSpc>
-              <a:buClr>
-                <a:srgbClr val="086DB4"/>
-              </a:buClr>
-              <a:buSzPct val="150000"/>
-              <a:buNone/>
-            </a:pPr>
-            <a:r>
-              <a:rPr lang="en-US" b="1" dirty="0">
-                <a:effectLst/>
-              </a:rPr>
-              <a:t>Yug Malik</a:t>
-            </a:r>
-            <a:endParaRPr lang="en-US" b="1" dirty="0"/>
-          </a:p>
-        </p:txBody>
-      </p:sp>
-      <p:sp>
-        <p:nvSpPr>
-          <p:cNvPr id="4" name="Content Placeholder 4">
-            <a:extLst>
-              <a:ext uri="{FF2B5EF4-FFF2-40B4-BE49-F238E27FC236}">
-                <a16:creationId xmlns:a16="http://schemas.microsoft.com/office/drawing/2014/main" id="{5524A941-BCEB-9E67-5CE2-C4C1C0D1946F}"/>
-              </a:ext>
-            </a:extLst>
-          </p:cNvPr>
-          <p:cNvSpPr txBox="1">
-            <a:spLocks/>
-          </p:cNvSpPr>
-          <p:nvPr/>
-        </p:nvSpPr>
-        <p:spPr>
-          <a:xfrm>
-            <a:off x="8274010" y="5188126"/>
-            <a:ext cx="2745090" cy="683145"/>
-          </a:xfrm>
-          <a:prstGeom prst="rect">
-            <a:avLst/>
-          </a:prstGeom>
-        </p:spPr>
-        <p:txBody>
-          <a:bodyPr vert="horz" lIns="91440" tIns="45720" rIns="91440" bIns="45720" rtlCol="0">
-            <a:noAutofit/>
-          </a:bodyPr>
-          <a:lstStyle>
-            <a:lvl1pPr marL="228600" indent="-228600" algn="l" defTabSz="914400" rtl="0" eaLnBrk="1" latinLnBrk="0" hangingPunct="1">
-              <a:lnSpc>
-                <a:spcPct val="90000"/>
-              </a:lnSpc>
-              <a:spcBef>
-                <a:spcPts val="1000"/>
-              </a:spcBef>
-              <a:buFont typeface="Arial" panose="020B0604020202020204" pitchFamily="34" charset="0"/>
-              <a:buChar char="•"/>
-              <a:defRPr lang="en-US" sz="2200" kern="1200" dirty="0" smtClean="0">
-                <a:solidFill>
-                  <a:schemeClr val="tx1"/>
-                </a:solidFill>
-                <a:latin typeface="+mn-lt"/>
-                <a:ea typeface="+mn-ea"/>
-                <a:cs typeface="+mn-cs"/>
-              </a:defRPr>
-            </a:lvl1pPr>
-            <a:lvl2pPr marL="685800" indent="-228600" algn="l" defTabSz="914400" rtl="0" eaLnBrk="1" latinLnBrk="0" hangingPunct="1">
-              <a:lnSpc>
-                <a:spcPct val="90000"/>
-              </a:lnSpc>
-              <a:spcBef>
-                <a:spcPts val="500"/>
-              </a:spcBef>
-              <a:buFont typeface="Arial" panose="020B0604020202020204" pitchFamily="34" charset="0"/>
-              <a:buChar char="•"/>
-              <a:defRPr sz="1800" kern="1200">
-                <a:solidFill>
-                  <a:schemeClr val="tx1"/>
-                </a:solidFill>
-                <a:latin typeface="+mn-lt"/>
-                <a:ea typeface="+mn-ea"/>
-                <a:cs typeface="+mn-cs"/>
-              </a:defRPr>
-            </a:lvl2pPr>
-            <a:lvl3pPr marL="1143000" indent="-228600" algn="l" defTabSz="914400" rtl="0" eaLnBrk="1" latinLnBrk="0" hangingPunct="1">
-              <a:lnSpc>
-                <a:spcPct val="90000"/>
-              </a:lnSpc>
-              <a:spcBef>
-                <a:spcPts val="500"/>
-              </a:spcBef>
-              <a:buFont typeface="Arial" panose="020B0604020202020204" pitchFamily="34" charset="0"/>
-              <a:buChar char="•"/>
-              <a:defRPr sz="1500" kern="1200">
-                <a:solidFill>
-                  <a:schemeClr val="tx1"/>
-                </a:solidFill>
-                <a:latin typeface="+mn-lt"/>
-                <a:ea typeface="+mn-ea"/>
-                <a:cs typeface="+mn-cs"/>
-              </a:defRPr>
-            </a:lvl3pPr>
-            <a:lvl4pPr marL="1600200" indent="-228600" algn="l" defTabSz="914400" rtl="0" eaLnBrk="1" latinLnBrk="0" hangingPunct="1">
-              <a:lnSpc>
-                <a:spcPct val="90000"/>
-              </a:lnSpc>
-              <a:spcBef>
-                <a:spcPts val="500"/>
-              </a:spcBef>
-              <a:buFont typeface="Arial" panose="020B0604020202020204" pitchFamily="34" charset="0"/>
-              <a:buChar char="•"/>
-              <a:defRPr sz="1800" kern="1200">
-                <a:solidFill>
-                  <a:schemeClr val="tx1"/>
-                </a:solidFill>
-                <a:latin typeface="+mn-lt"/>
-                <a:ea typeface="+mn-ea"/>
-                <a:cs typeface="+mn-cs"/>
-              </a:defRPr>
-            </a:lvl4pPr>
-            <a:lvl5pPr marL="2057400" indent="-228600" algn="l" defTabSz="914400" rtl="0" eaLnBrk="1" latinLnBrk="0" hangingPunct="1">
-              <a:lnSpc>
-                <a:spcPct val="90000"/>
-              </a:lnSpc>
-              <a:spcBef>
-                <a:spcPts val="500"/>
-              </a:spcBef>
-              <a:buFont typeface="Arial" panose="020B0604020202020204" pitchFamily="34" charset="0"/>
-              <a:buChar char="•"/>
-              <a:defRPr sz="1800" kern="1200">
-                <a:solidFill>
-                  <a:schemeClr val="tx1"/>
-                </a:solidFill>
-                <a:latin typeface="+mn-lt"/>
-                <a:ea typeface="+mn-ea"/>
-                <a:cs typeface="+mn-cs"/>
-              </a:defRPr>
-            </a:lvl5pPr>
-            <a:lvl6pPr marL="2514600" indent="-228600" algn="l" defTabSz="914400" rtl="0" eaLnBrk="1" latinLnBrk="0" hangingPunct="1">
-              <a:lnSpc>
-                <a:spcPct val="90000"/>
-              </a:lnSpc>
-              <a:spcBef>
-                <a:spcPts val="500"/>
-              </a:spcBef>
-              <a:buFont typeface="Arial" panose="020B0604020202020204" pitchFamily="34" charset="0"/>
-              <a:buChar char="•"/>
-              <a:defRPr sz="1800" kern="1200">
-                <a:solidFill>
-                  <a:schemeClr val="tx1"/>
-                </a:solidFill>
-                <a:latin typeface="+mn-lt"/>
-                <a:ea typeface="+mn-ea"/>
-                <a:cs typeface="+mn-cs"/>
-              </a:defRPr>
-            </a:lvl6pPr>
-            <a:lvl7pPr marL="2971800" indent="-228600" algn="l" defTabSz="914400" rtl="0" eaLnBrk="1" latinLnBrk="0" hangingPunct="1">
-              <a:lnSpc>
-                <a:spcPct val="90000"/>
-              </a:lnSpc>
-              <a:spcBef>
-                <a:spcPts val="500"/>
-              </a:spcBef>
-              <a:buFont typeface="Arial" panose="020B0604020202020204" pitchFamily="34" charset="0"/>
-              <a:buChar char="•"/>
-              <a:defRPr sz="1800" kern="1200">
-                <a:solidFill>
-                  <a:schemeClr val="tx1"/>
-                </a:solidFill>
-                <a:latin typeface="+mn-lt"/>
-                <a:ea typeface="+mn-ea"/>
-                <a:cs typeface="+mn-cs"/>
-              </a:defRPr>
-            </a:lvl7pPr>
-            <a:lvl8pPr marL="3429000" indent="-228600" algn="l" defTabSz="914400" rtl="0" eaLnBrk="1" latinLnBrk="0" hangingPunct="1">
-              <a:lnSpc>
-                <a:spcPct val="90000"/>
-              </a:lnSpc>
-              <a:spcBef>
-                <a:spcPts val="500"/>
-              </a:spcBef>
-              <a:buFont typeface="Arial" panose="020B0604020202020204" pitchFamily="34" charset="0"/>
-              <a:buChar char="•"/>
-              <a:defRPr sz="1800" kern="1200">
-                <a:solidFill>
-                  <a:schemeClr val="tx1"/>
-                </a:solidFill>
-                <a:latin typeface="+mn-lt"/>
-                <a:ea typeface="+mn-ea"/>
-                <a:cs typeface="+mn-cs"/>
-              </a:defRPr>
-            </a:lvl8pPr>
-            <a:lvl9pPr marL="3886200" indent="-228600" algn="l" defTabSz="914400" rtl="0" eaLnBrk="1" latinLnBrk="0" hangingPunct="1">
-              <a:lnSpc>
-                <a:spcPct val="90000"/>
-              </a:lnSpc>
-              <a:spcBef>
-                <a:spcPts val="500"/>
-              </a:spcBef>
-              <a:buFont typeface="Arial" panose="020B0604020202020204" pitchFamily="34" charset="0"/>
-              <a:buChar char="•"/>
-              <a:defRPr sz="1800" kern="1200">
-                <a:solidFill>
-                  <a:schemeClr val="tx1"/>
-                </a:solidFill>
-                <a:latin typeface="+mn-lt"/>
-                <a:ea typeface="+mn-ea"/>
-                <a:cs typeface="+mn-cs"/>
-              </a:defRPr>
-            </a:lvl9pPr>
-          </a:lstStyle>
-          <a:p>
-            <a:pPr marL="0" indent="0" algn="ctr">
-              <a:lnSpc>
-                <a:spcPct val="100000"/>
-              </a:lnSpc>
-              <a:spcBef>
-                <a:spcPts val="600"/>
-              </a:spcBef>
-              <a:spcAft>
-                <a:spcPts val="600"/>
-              </a:spcAft>
-              <a:buClr>
-                <a:srgbClr val="086DB4"/>
-              </a:buClr>
-              <a:buSzPct val="150000"/>
-              <a:buNone/>
-            </a:pPr>
-            <a:r>
-              <a:rPr lang="en-US" sz="1600" dirty="0">
-                <a:solidFill>
-                  <a:schemeClr val="accent2">
-                    <a:lumMod val="75000"/>
-                  </a:schemeClr>
-                </a:solidFill>
-              </a:rPr>
-              <a:t>AI &amp; Digital Strategy Expert</a:t>
-            </a:r>
-          </a:p>
-        </p:txBody>
-      </p:sp>
-      <p:sp>
-        <p:nvSpPr>
-          <p:cNvPr id="5" name="Content Placeholder 4">
-            <a:extLst>
-              <a:ext uri="{FF2B5EF4-FFF2-40B4-BE49-F238E27FC236}">
-                <a16:creationId xmlns:a16="http://schemas.microsoft.com/office/drawing/2014/main" id="{8FDE4A54-54B9-5A69-6DE7-1FCA3A1CBC4B}"/>
-              </a:ext>
-            </a:extLst>
-          </p:cNvPr>
-          <p:cNvSpPr txBox="1">
-            <a:spLocks/>
-          </p:cNvSpPr>
-          <p:nvPr/>
-        </p:nvSpPr>
-        <p:spPr>
-          <a:xfrm>
-            <a:off x="350836" y="2963750"/>
-            <a:ext cx="5382307" cy="1061350"/>
-          </a:xfrm>
-          <a:prstGeom prst="rect">
-            <a:avLst/>
-          </a:prstGeom>
-        </p:spPr>
-        <p:txBody>
-          <a:bodyPr vert="horz" lIns="91440" tIns="45720" rIns="91440" bIns="45720" rtlCol="0">
-            <a:noAutofit/>
-          </a:bodyPr>
-          <a:lstStyle>
-            <a:lvl1pPr marL="228600" indent="-228600" algn="l" defTabSz="914400" rtl="0" eaLnBrk="1" latinLnBrk="0" hangingPunct="1">
-              <a:lnSpc>
-                <a:spcPct val="90000"/>
-              </a:lnSpc>
-              <a:spcBef>
-                <a:spcPts val="1000"/>
-              </a:spcBef>
-              <a:buFont typeface="Arial" panose="020B0604020202020204" pitchFamily="34" charset="0"/>
-              <a:buChar char="•"/>
-              <a:defRPr lang="en-US" sz="2200" kern="1200" dirty="0" smtClean="0">
-                <a:solidFill>
-                  <a:schemeClr val="tx1"/>
-                </a:solidFill>
-                <a:latin typeface="+mn-lt"/>
-                <a:ea typeface="+mn-ea"/>
-                <a:cs typeface="+mn-cs"/>
-              </a:defRPr>
-            </a:lvl1pPr>
-            <a:lvl2pPr marL="685800" indent="-228600" algn="l" defTabSz="914400" rtl="0" eaLnBrk="1" latinLnBrk="0" hangingPunct="1">
-              <a:lnSpc>
-                <a:spcPct val="90000"/>
-              </a:lnSpc>
-              <a:spcBef>
-                <a:spcPts val="500"/>
-              </a:spcBef>
-              <a:buFont typeface="Arial" panose="020B0604020202020204" pitchFamily="34" charset="0"/>
-              <a:buChar char="•"/>
-              <a:defRPr sz="1800" kern="1200">
-                <a:solidFill>
-                  <a:schemeClr val="tx1"/>
-                </a:solidFill>
-                <a:latin typeface="+mn-lt"/>
-                <a:ea typeface="+mn-ea"/>
-                <a:cs typeface="+mn-cs"/>
-              </a:defRPr>
-            </a:lvl2pPr>
-            <a:lvl3pPr marL="1143000" indent="-228600" algn="l" defTabSz="914400" rtl="0" eaLnBrk="1" latinLnBrk="0" hangingPunct="1">
-              <a:lnSpc>
-                <a:spcPct val="90000"/>
-              </a:lnSpc>
-              <a:spcBef>
-                <a:spcPts val="500"/>
-              </a:spcBef>
-              <a:buFont typeface="Arial" panose="020B0604020202020204" pitchFamily="34" charset="0"/>
-              <a:buChar char="•"/>
-              <a:defRPr sz="1500" kern="1200">
-                <a:solidFill>
-                  <a:schemeClr val="tx1"/>
-                </a:solidFill>
-                <a:latin typeface="+mn-lt"/>
-                <a:ea typeface="+mn-ea"/>
-                <a:cs typeface="+mn-cs"/>
-              </a:defRPr>
-            </a:lvl3pPr>
-            <a:lvl4pPr marL="1600200" indent="-228600" algn="l" defTabSz="914400" rtl="0" eaLnBrk="1" latinLnBrk="0" hangingPunct="1">
-              <a:lnSpc>
-                <a:spcPct val="90000"/>
-              </a:lnSpc>
-              <a:spcBef>
-                <a:spcPts val="500"/>
-              </a:spcBef>
-              <a:buFont typeface="Arial" panose="020B0604020202020204" pitchFamily="34" charset="0"/>
-              <a:buChar char="•"/>
-              <a:defRPr sz="1800" kern="1200">
-                <a:solidFill>
-                  <a:schemeClr val="tx1"/>
-                </a:solidFill>
-                <a:latin typeface="+mn-lt"/>
-                <a:ea typeface="+mn-ea"/>
-                <a:cs typeface="+mn-cs"/>
-              </a:defRPr>
-            </a:lvl4pPr>
-            <a:lvl5pPr marL="2057400" indent="-228600" algn="l" defTabSz="914400" rtl="0" eaLnBrk="1" latinLnBrk="0" hangingPunct="1">
-              <a:lnSpc>
-                <a:spcPct val="90000"/>
-              </a:lnSpc>
-              <a:spcBef>
-                <a:spcPts val="500"/>
-              </a:spcBef>
-              <a:buFont typeface="Arial" panose="020B0604020202020204" pitchFamily="34" charset="0"/>
-              <a:buChar char="•"/>
-              <a:defRPr sz="1800" kern="1200">
-                <a:solidFill>
-                  <a:schemeClr val="tx1"/>
-                </a:solidFill>
-                <a:latin typeface="+mn-lt"/>
-                <a:ea typeface="+mn-ea"/>
-                <a:cs typeface="+mn-cs"/>
-              </a:defRPr>
-            </a:lvl5pPr>
-            <a:lvl6pPr marL="2514600" indent="-228600" algn="l" defTabSz="914400" rtl="0" eaLnBrk="1" latinLnBrk="0" hangingPunct="1">
-              <a:lnSpc>
-                <a:spcPct val="90000"/>
-              </a:lnSpc>
-              <a:spcBef>
-                <a:spcPts val="500"/>
-              </a:spcBef>
-              <a:buFont typeface="Arial" panose="020B0604020202020204" pitchFamily="34" charset="0"/>
-              <a:buChar char="•"/>
-              <a:defRPr sz="1800" kern="1200">
-                <a:solidFill>
-                  <a:schemeClr val="tx1"/>
-                </a:solidFill>
-                <a:latin typeface="+mn-lt"/>
-                <a:ea typeface="+mn-ea"/>
-                <a:cs typeface="+mn-cs"/>
-              </a:defRPr>
-            </a:lvl6pPr>
-            <a:lvl7pPr marL="2971800" indent="-228600" algn="l" defTabSz="914400" rtl="0" eaLnBrk="1" latinLnBrk="0" hangingPunct="1">
-              <a:lnSpc>
-                <a:spcPct val="90000"/>
-              </a:lnSpc>
-              <a:spcBef>
-                <a:spcPts val="500"/>
-              </a:spcBef>
-              <a:buFont typeface="Arial" panose="020B0604020202020204" pitchFamily="34" charset="0"/>
-              <a:buChar char="•"/>
-              <a:defRPr sz="1800" kern="1200">
-                <a:solidFill>
-                  <a:schemeClr val="tx1"/>
-                </a:solidFill>
-                <a:latin typeface="+mn-lt"/>
-                <a:ea typeface="+mn-ea"/>
-                <a:cs typeface="+mn-cs"/>
-              </a:defRPr>
-            </a:lvl7pPr>
-            <a:lvl8pPr marL="3429000" indent="-228600" algn="l" defTabSz="914400" rtl="0" eaLnBrk="1" latinLnBrk="0" hangingPunct="1">
-              <a:lnSpc>
-                <a:spcPct val="90000"/>
-              </a:lnSpc>
-              <a:spcBef>
-                <a:spcPts val="500"/>
-              </a:spcBef>
-              <a:buFont typeface="Arial" panose="020B0604020202020204" pitchFamily="34" charset="0"/>
-              <a:buChar char="•"/>
-              <a:defRPr sz="1800" kern="1200">
-                <a:solidFill>
-                  <a:schemeClr val="tx1"/>
-                </a:solidFill>
-                <a:latin typeface="+mn-lt"/>
-                <a:ea typeface="+mn-ea"/>
-                <a:cs typeface="+mn-cs"/>
-              </a:defRPr>
-            </a:lvl8pPr>
-            <a:lvl9pPr marL="3886200" indent="-228600" algn="l" defTabSz="914400" rtl="0" eaLnBrk="1" latinLnBrk="0" hangingPunct="1">
-              <a:lnSpc>
-                <a:spcPct val="90000"/>
-              </a:lnSpc>
-              <a:spcBef>
-                <a:spcPts val="500"/>
-              </a:spcBef>
-              <a:buFont typeface="Arial" panose="020B0604020202020204" pitchFamily="34" charset="0"/>
-              <a:buChar char="•"/>
-              <a:defRPr sz="1800" kern="1200">
-                <a:solidFill>
-                  <a:schemeClr val="tx1"/>
-                </a:solidFill>
-                <a:latin typeface="+mn-lt"/>
-                <a:ea typeface="+mn-ea"/>
-                <a:cs typeface="+mn-cs"/>
-              </a:defRPr>
-            </a:lvl9pPr>
-          </a:lstStyle>
-          <a:p>
-            <a:pPr marL="0" indent="0">
-              <a:lnSpc>
-                <a:spcPct val="100000"/>
-              </a:lnSpc>
-              <a:buClr>
-                <a:srgbClr val="086DB4"/>
-              </a:buClr>
-              <a:buSzPct val="150000"/>
-              <a:buNone/>
-            </a:pPr>
-            <a:r>
-              <a:rPr lang="en-US" sz="3000" b="1" dirty="0">
-                <a:solidFill>
-                  <a:srgbClr val="E25B00"/>
-                </a:solidFill>
-                <a:effectLst/>
-              </a:rPr>
-              <a:t>Integrating Azure AI services into business workflows</a:t>
-            </a:r>
-            <a:endParaRPr lang="en-US" sz="3000" b="1" dirty="0">
-              <a:solidFill>
-                <a:srgbClr val="E25B00"/>
-              </a:solidFill>
-            </a:endParaRPr>
-          </a:p>
-        </p:txBody>
-      </p:sp>
-      <p:sp>
-        <p:nvSpPr>
-          <p:cNvPr id="6" name="Title 1">
-            <a:extLst>
-              <a:ext uri="{FF2B5EF4-FFF2-40B4-BE49-F238E27FC236}">
-                <a16:creationId xmlns:a16="http://schemas.microsoft.com/office/drawing/2014/main" id="{F4C127B8-7CA1-4589-0EF8-E283628EDB5C}"/>
-              </a:ext>
-            </a:extLst>
-          </p:cNvPr>
-          <p:cNvSpPr txBox="1">
-            <a:spLocks/>
-          </p:cNvSpPr>
-          <p:nvPr/>
-        </p:nvSpPr>
-        <p:spPr>
-          <a:xfrm>
-            <a:off x="350836" y="783578"/>
-            <a:ext cx="5181600" cy="1224916"/>
-          </a:xfrm>
-          <a:prstGeom prst="rect">
-            <a:avLst/>
-          </a:prstGeom>
-        </p:spPr>
-        <p:txBody>
-          <a:bodyPr vert="horz" lIns="91440" tIns="548640" rIns="91440" bIns="0" rtlCol="0" anchor="b">
-            <a:noAutofit/>
-          </a:bodyPr>
-          <a:lstStyle>
-            <a:lvl1pPr algn="l" defTabSz="914400" rtl="0" eaLnBrk="1" latinLnBrk="0" hangingPunct="1">
-              <a:lnSpc>
-                <a:spcPct val="100000"/>
-              </a:lnSpc>
-              <a:spcBef>
-                <a:spcPct val="0"/>
-              </a:spcBef>
-              <a:buNone/>
-              <a:defRPr sz="5000" b="1" kern="1200">
-                <a:solidFill>
-                  <a:srgbClr val="086DB4"/>
-                </a:solidFill>
-                <a:latin typeface="+mj-lt"/>
-                <a:ea typeface="+mj-ea"/>
-                <a:cs typeface="+mj-cs"/>
-              </a:defRPr>
-            </a:lvl1pPr>
-          </a:lstStyle>
-          <a:p>
-            <a:r>
-              <a:rPr lang="en-US" dirty="0">
-                <a:solidFill>
-                  <a:schemeClr val="bg1"/>
-                </a:solidFill>
-              </a:rPr>
-              <a:t>Next Session</a:t>
-            </a:r>
-            <a:endParaRPr lang="en-US" dirty="0">
-              <a:solidFill>
-                <a:srgbClr val="2B5B50"/>
-              </a:solidFill>
-            </a:endParaRPr>
-          </a:p>
-        </p:txBody>
-      </p:sp>
     </p:spTree>
     <p:extLst>
       <p:ext uri="{BB962C8B-B14F-4D97-AF65-F5344CB8AC3E}">
-        <p14:creationId xmlns:p14="http://schemas.microsoft.com/office/powerpoint/2010/main" val="3302996869"/>
+        <p14:creationId xmlns:p14="http://schemas.microsoft.com/office/powerpoint/2010/main" val="4288126697"/>
       </p:ext>
     </p:extLst>
   </p:cSld>
@@ -8442,81 +9400,47 @@
           <a:p>
             <a:r>
               <a:rPr lang="en-US" sz="4000" b="1" dirty="0"/>
-              <a:t>Why Llama Stack?</a:t>
+              <a:t>GenAI application architecture</a:t>
             </a:r>
             <a:endParaRPr lang="en-IN" sz="4000" b="1" dirty="0"/>
           </a:p>
         </p:txBody>
       </p:sp>
-      <p:sp>
-        <p:nvSpPr>
-          <p:cNvPr id="4" name="TextBox 3">
-            <a:extLst>
-              <a:ext uri="{FF2B5EF4-FFF2-40B4-BE49-F238E27FC236}">
-                <a16:creationId xmlns:a16="http://schemas.microsoft.com/office/drawing/2014/main" id="{4B661BDC-45DD-81D3-6296-0FD2B8F0EBEA}"/>
-              </a:ext>
-            </a:extLst>
-          </p:cNvPr>
-          <p:cNvSpPr txBox="1"/>
+      <p:pic>
+        <p:nvPicPr>
+          <p:cNvPr id="6" name="Picture 5" descr="A screenshot of a computer&#10;&#10;AI-generated content may be incorrect.">
+            <a:extLst>
+              <a:ext uri="{FF2B5EF4-FFF2-40B4-BE49-F238E27FC236}">
+                <a16:creationId xmlns:a16="http://schemas.microsoft.com/office/drawing/2014/main" id="{99EBFA88-CCB1-40BC-37EE-8B59CAF7E2C5}"/>
+              </a:ext>
+            </a:extLst>
+          </p:cNvPr>
+          <p:cNvPicPr>
+            <a:picLocks noChangeAspect="1"/>
+          </p:cNvPicPr>
           <p:nvPr/>
-        </p:nvSpPr>
+        </p:nvPicPr>
+        <p:blipFill>
+          <a:blip r:embed="rId3">
+            <a:extLst>
+              <a:ext uri="{28A0092B-C50C-407E-A947-70E740481C1C}">
+                <a14:useLocalDpi xmlns:a14="http://schemas.microsoft.com/office/drawing/2010/main" val="0"/>
+              </a:ext>
+            </a:extLst>
+          </a:blip>
+          <a:srcRect t="11072" b="-2837"/>
+          <a:stretch/>
+        </p:blipFill>
         <p:spPr>
           <a:xfrm>
-            <a:off x="271220" y="1309607"/>
-            <a:ext cx="11507492" cy="1815882"/>
-          </a:xfrm>
-          <a:prstGeom prst="rect">
-            <a:avLst/>
-          </a:prstGeom>
-          <a:noFill/>
-        </p:spPr>
-        <p:txBody>
-          <a:bodyPr wrap="square" rtlCol="0">
-            <a:spAutoFit/>
-          </a:bodyPr>
-          <a:lstStyle/>
-          <a:p>
-            <a:pPr marL="285750" indent="-285750">
-              <a:buFont typeface="Arial" panose="020B0604020202020204" pitchFamily="34" charset="0"/>
-              <a:buChar char="•"/>
-            </a:pPr>
-            <a:r>
-              <a:rPr lang="en-US" sz="2800" dirty="0"/>
-              <a:t>A generative AI application has many moving parts</a:t>
-            </a:r>
-          </a:p>
-          <a:p>
-            <a:pPr marL="285750" indent="-285750">
-              <a:buFont typeface="Arial" panose="020B0604020202020204" pitchFamily="34" charset="0"/>
-              <a:buChar char="•"/>
-            </a:pPr>
-            <a:r>
-              <a:rPr lang="en-IN" sz="2800" dirty="0"/>
-              <a:t>Open Source is challenging without knowing what is supported</a:t>
-            </a:r>
-          </a:p>
-          <a:p>
-            <a:pPr marL="285750" indent="-285750">
-              <a:buFont typeface="Arial" panose="020B0604020202020204" pitchFamily="34" charset="0"/>
-              <a:buChar char="•"/>
-            </a:pPr>
-            <a:r>
-              <a:rPr lang="en-IN" sz="2800" dirty="0"/>
-              <a:t>The barrier to entry is higher</a:t>
-            </a:r>
-          </a:p>
-          <a:p>
-            <a:pPr marL="285750" indent="-285750">
-              <a:buFont typeface="Arial" panose="020B0604020202020204" pitchFamily="34" charset="0"/>
-              <a:buChar char="•"/>
-            </a:pPr>
-            <a:r>
-              <a:rPr lang="en-IN" sz="2800" dirty="0"/>
-              <a:t>It isn’t trivial to try models in different environments (cloud and on-prem)</a:t>
-            </a:r>
-          </a:p>
-        </p:txBody>
-      </p:sp>
+            <a:off x="532108" y="924862"/>
+            <a:ext cx="11127783" cy="5260288"/>
+          </a:xfrm>
+          <a:prstGeom prst="rect">
+            <a:avLst/>
+          </a:prstGeom>
+        </p:spPr>
+      </p:pic>
     </p:spTree>
     <p:extLst>
       <p:ext uri="{BB962C8B-B14F-4D97-AF65-F5344CB8AC3E}">
@@ -8531,6 +9455,137 @@
 </file>
 
 <file path=ppt/slides/slide4.xml><?xml version="1.0" encoding="utf-8"?>
+<p:sld xmlns:a="http://schemas.openxmlformats.org/drawingml/2006/main" xmlns:r="http://schemas.openxmlformats.org/officeDocument/2006/relationships" xmlns:p="http://schemas.openxmlformats.org/presentationml/2006/main">
+  <p:cSld>
+    <p:spTree>
+      <p:nvGrpSpPr>
+        <p:cNvPr id="1" name="">
+          <a:extLst>
+            <a:ext uri="{FF2B5EF4-FFF2-40B4-BE49-F238E27FC236}">
+              <a16:creationId xmlns:a16="http://schemas.microsoft.com/office/drawing/2014/main" id="{983330CF-F04B-7F27-E443-5A96CEA9E35D}"/>
+            </a:ext>
+          </a:extLst>
+        </p:cNvPr>
+        <p:cNvGrpSpPr/>
+        <p:nvPr/>
+      </p:nvGrpSpPr>
+      <p:grpSpPr>
+        <a:xfrm>
+          <a:off x="0" y="0"/>
+          <a:ext cx="0" cy="0"/>
+          <a:chOff x="0" y="0"/>
+          <a:chExt cx="0" cy="0"/>
+        </a:xfrm>
+      </p:grpSpPr>
+      <p:sp>
+        <p:nvSpPr>
+          <p:cNvPr id="2" name="TextBox 1">
+            <a:extLst>
+              <a:ext uri="{FF2B5EF4-FFF2-40B4-BE49-F238E27FC236}">
+                <a16:creationId xmlns:a16="http://schemas.microsoft.com/office/drawing/2014/main" id="{DF3931C0-5E82-E40E-7B53-0A216D08968A}"/>
+              </a:ext>
+            </a:extLst>
+          </p:cNvPr>
+          <p:cNvSpPr txBox="1"/>
+          <p:nvPr/>
+        </p:nvSpPr>
+        <p:spPr>
+          <a:xfrm>
+            <a:off x="271220" y="216976"/>
+            <a:ext cx="11920779" cy="707886"/>
+          </a:xfrm>
+          <a:prstGeom prst="rect">
+            <a:avLst/>
+          </a:prstGeom>
+          <a:noFill/>
+        </p:spPr>
+        <p:txBody>
+          <a:bodyPr wrap="square" rtlCol="0">
+            <a:spAutoFit/>
+          </a:bodyPr>
+          <a:lstStyle/>
+          <a:p>
+            <a:r>
+              <a:rPr lang="en-US" sz="4000" b="1" dirty="0"/>
+              <a:t>Challenges building enterprise AI applications </a:t>
+            </a:r>
+            <a:endParaRPr lang="en-IN" sz="4000" b="1" dirty="0"/>
+          </a:p>
+        </p:txBody>
+      </p:sp>
+      <p:sp>
+        <p:nvSpPr>
+          <p:cNvPr id="4" name="TextBox 3">
+            <a:extLst>
+              <a:ext uri="{FF2B5EF4-FFF2-40B4-BE49-F238E27FC236}">
+                <a16:creationId xmlns:a16="http://schemas.microsoft.com/office/drawing/2014/main" id="{5E79CF25-7619-7A55-BEEA-86D22FB2C415}"/>
+              </a:ext>
+            </a:extLst>
+          </p:cNvPr>
+          <p:cNvSpPr txBox="1"/>
+          <p:nvPr/>
+        </p:nvSpPr>
+        <p:spPr>
+          <a:xfrm>
+            <a:off x="271220" y="1309607"/>
+            <a:ext cx="11507492" cy="1384995"/>
+          </a:xfrm>
+          <a:prstGeom prst="rect">
+            <a:avLst/>
+          </a:prstGeom>
+          <a:noFill/>
+        </p:spPr>
+        <p:txBody>
+          <a:bodyPr wrap="square" rtlCol="0">
+            <a:spAutoFit/>
+          </a:bodyPr>
+          <a:lstStyle/>
+          <a:p>
+            <a:pPr marL="285750" indent="-285750">
+              <a:buFont typeface="Arial" panose="020B0604020202020204" pitchFamily="34" charset="0"/>
+              <a:buChar char="•"/>
+            </a:pPr>
+            <a:r>
+              <a:rPr lang="en-US" sz="2800" dirty="0"/>
+              <a:t>Higher infrastructure complexity</a:t>
+            </a:r>
+          </a:p>
+          <a:p>
+            <a:pPr marL="285750" indent="-285750">
+              <a:buFont typeface="Arial" panose="020B0604020202020204" pitchFamily="34" charset="0"/>
+              <a:buChar char="•"/>
+            </a:pPr>
+            <a:r>
+              <a:rPr lang="en-US" sz="2800" dirty="0"/>
+              <a:t>Requires non-trivial capabilities</a:t>
+            </a:r>
+          </a:p>
+          <a:p>
+            <a:pPr marL="285750" indent="-285750">
+              <a:buFont typeface="Arial" panose="020B0604020202020204" pitchFamily="34" charset="0"/>
+              <a:buChar char="•"/>
+            </a:pPr>
+            <a:r>
+              <a:rPr lang="en-IN" sz="2800" dirty="0"/>
+              <a:t>Lack of flexibility and choice</a:t>
+            </a:r>
+          </a:p>
+        </p:txBody>
+      </p:sp>
+    </p:spTree>
+    <p:extLst>
+      <p:ext uri="{BB962C8B-B14F-4D97-AF65-F5344CB8AC3E}">
+        <p14:creationId xmlns:p14="http://schemas.microsoft.com/office/powerpoint/2010/main" val="2287862067"/>
+      </p:ext>
+    </p:extLst>
+  </p:cSld>
+  <p:clrMapOvr>
+    <a:masterClrMapping/>
+  </p:clrMapOvr>
+</p:sld>
+</file>
+
+<file path=ppt/slides/slide5.xml><?xml version="1.0" encoding="utf-8"?>
 <p:sld xmlns:a="http://schemas.openxmlformats.org/drawingml/2006/main" xmlns:r="http://schemas.openxmlformats.org/officeDocument/2006/relationships" xmlns:p="http://schemas.openxmlformats.org/presentationml/2006/main">
   <p:cSld>
     <p:spTree>
@@ -8705,7 +9760,7 @@
           <p:nvPr/>
         </p:nvPicPr>
         <p:blipFill>
-          <a:blip r:embed="rId2">
+          <a:blip r:embed="rId3">
             <a:extLst>
               <a:ext uri="{28A0092B-C50C-407E-A947-70E740481C1C}">
                 <a14:useLocalDpi xmlns:a14="http://schemas.microsoft.com/office/drawing/2010/main" val="0"/>
@@ -8750,7 +9805,7 @@
 </p:sld>
 </file>
 
-<file path=ppt/slides/slide5.xml><?xml version="1.0" encoding="utf-8"?>
+<file path=ppt/slides/slide6.xml><?xml version="1.0" encoding="utf-8"?>
 <p:sld xmlns:a="http://schemas.openxmlformats.org/drawingml/2006/main" xmlns:r="http://schemas.openxmlformats.org/officeDocument/2006/relationships" xmlns:p="http://schemas.openxmlformats.org/presentationml/2006/main">
   <p:cSld>
     <p:spTree>
@@ -8824,7 +9879,7 @@
           <p:nvPr/>
         </p:nvPicPr>
         <p:blipFill>
-          <a:blip r:embed="rId2"/>
+          <a:blip r:embed="rId3"/>
           <a:stretch>
             <a:fillRect/>
           </a:stretch>
@@ -8852,7 +9907,7 @@
 </p:sld>
 </file>
 
-<file path=ppt/slides/slide6.xml><?xml version="1.0" encoding="utf-8"?>
+<file path=ppt/slides/slide7.xml><?xml version="1.0" encoding="utf-8"?>
 <p:sld xmlns:a="http://schemas.openxmlformats.org/drawingml/2006/main" xmlns:r="http://schemas.openxmlformats.org/officeDocument/2006/relationships" xmlns:p="http://schemas.openxmlformats.org/presentationml/2006/main">
   <p:cSld>
     <p:spTree>
@@ -9267,7 +10322,7 @@
 </p:sld>
 </file>
 
-<file path=ppt/slides/slide7.xml><?xml version="1.0" encoding="utf-8"?>
+<file path=ppt/slides/slide8.xml><?xml version="1.0" encoding="utf-8"?>
 <p:sld xmlns:a="http://schemas.openxmlformats.org/drawingml/2006/main" xmlns:r="http://schemas.openxmlformats.org/officeDocument/2006/relationships" xmlns:p="http://schemas.openxmlformats.org/presentationml/2006/main">
   <p:cSld>
     <p:spTree>
@@ -9527,7 +10582,7 @@
 </p:sld>
 </file>
 
-<file path=ppt/slides/slide8.xml><?xml version="1.0" encoding="utf-8"?>
+<file path=ppt/slides/slide9.xml><?xml version="1.0" encoding="utf-8"?>
 <p:sld xmlns:a="http://schemas.openxmlformats.org/drawingml/2006/main" xmlns:r="http://schemas.openxmlformats.org/officeDocument/2006/relationships" xmlns:p="http://schemas.openxmlformats.org/presentationml/2006/main">
   <p:cSld>
     <p:spTree>
@@ -9626,80 +10681,6 @@
     <p:extLst>
       <p:ext uri="{BB962C8B-B14F-4D97-AF65-F5344CB8AC3E}">
         <p14:creationId xmlns:p14="http://schemas.microsoft.com/office/powerpoint/2010/main" val="722803548"/>
-      </p:ext>
-    </p:extLst>
-  </p:cSld>
-  <p:clrMapOvr>
-    <a:masterClrMapping/>
-  </p:clrMapOvr>
-</p:sld>
-</file>
-
-<file path=ppt/slides/slide9.xml><?xml version="1.0" encoding="utf-8"?>
-<p:sld xmlns:a="http://schemas.openxmlformats.org/drawingml/2006/main" xmlns:r="http://schemas.openxmlformats.org/officeDocument/2006/relationships" xmlns:p="http://schemas.openxmlformats.org/presentationml/2006/main">
-  <p:cSld>
-    <p:spTree>
-      <p:nvGrpSpPr>
-        <p:cNvPr id="1" name=""/>
-        <p:cNvGrpSpPr/>
-        <p:nvPr/>
-      </p:nvGrpSpPr>
-      <p:grpSpPr>
-        <a:xfrm>
-          <a:off x="0" y="0"/>
-          <a:ext cx="0" cy="0"/>
-          <a:chOff x="0" y="0"/>
-          <a:chExt cx="0" cy="0"/>
-        </a:xfrm>
-      </p:grpSpPr>
-      <p:sp>
-        <p:nvSpPr>
-          <p:cNvPr id="2" name="TextBox 1">
-            <a:extLst>
-              <a:ext uri="{FF2B5EF4-FFF2-40B4-BE49-F238E27FC236}">
-                <a16:creationId xmlns:a16="http://schemas.microsoft.com/office/drawing/2014/main" id="{8CDFA69C-7B27-CDE7-F9A0-024FA9521B52}"/>
-              </a:ext>
-            </a:extLst>
-          </p:cNvPr>
-          <p:cNvSpPr txBox="1"/>
-          <p:nvPr/>
-        </p:nvSpPr>
-        <p:spPr>
-          <a:xfrm>
-            <a:off x="542440" y="2505670"/>
-            <a:ext cx="1874231" cy="923330"/>
-          </a:xfrm>
-          <a:prstGeom prst="rect">
-            <a:avLst/>
-          </a:prstGeom>
-          <a:noFill/>
-        </p:spPr>
-        <p:txBody>
-          <a:bodyPr wrap="none" rtlCol="0">
-            <a:spAutoFit/>
-          </a:bodyPr>
-          <a:lstStyle/>
-          <a:p>
-            <a:r>
-              <a:rPr lang="en-US" sz="5400" dirty="0">
-                <a:solidFill>
-                  <a:schemeClr val="bg1"/>
-                </a:solidFill>
-              </a:rPr>
-              <a:t>Demo</a:t>
-            </a:r>
-            <a:endParaRPr lang="en-IN" sz="5400" dirty="0">
-              <a:solidFill>
-                <a:schemeClr val="bg1"/>
-              </a:solidFill>
-            </a:endParaRPr>
-          </a:p>
-        </p:txBody>
-      </p:sp>
-    </p:spTree>
-    <p:extLst>
-      <p:ext uri="{BB962C8B-B14F-4D97-AF65-F5344CB8AC3E}">
-        <p14:creationId xmlns:p14="http://schemas.microsoft.com/office/powerpoint/2010/main" val="2087009837"/>
       </p:ext>
     </p:extLst>
   </p:cSld>
@@ -10019,4 +11000,319 @@
     </a:ext>
   </a:extLst>
 </a:theme>
+</file>
+
+<file path=ppt/theme/theme2.xml><?xml version="1.0" encoding="utf-8"?>
+<a:theme xmlns:a="http://schemas.openxmlformats.org/drawingml/2006/main" name="Office Theme">
+  <a:themeElements>
+    <a:clrScheme name="Office">
+      <a:dk1>
+        <a:sysClr val="windowText" lastClr="000000"/>
+      </a:dk1>
+      <a:lt1>
+        <a:sysClr val="window" lastClr="FFFFFF"/>
+      </a:lt1>
+      <a:dk2>
+        <a:srgbClr val="0E2841"/>
+      </a:dk2>
+      <a:lt2>
+        <a:srgbClr val="E8E8E8"/>
+      </a:lt2>
+      <a:accent1>
+        <a:srgbClr val="156082"/>
+      </a:accent1>
+      <a:accent2>
+        <a:srgbClr val="E97132"/>
+      </a:accent2>
+      <a:accent3>
+        <a:srgbClr val="196B24"/>
+      </a:accent3>
+      <a:accent4>
+        <a:srgbClr val="0F9ED5"/>
+      </a:accent4>
+      <a:accent5>
+        <a:srgbClr val="A02B93"/>
+      </a:accent5>
+      <a:accent6>
+        <a:srgbClr val="4EA72E"/>
+      </a:accent6>
+      <a:hlink>
+        <a:srgbClr val="467886"/>
+      </a:hlink>
+      <a:folHlink>
+        <a:srgbClr val="96607D"/>
+      </a:folHlink>
+    </a:clrScheme>
+    <a:fontScheme name="Office">
+      <a:majorFont>
+        <a:latin typeface="Aptos Display" panose="02110004020202020204"/>
+        <a:ea typeface=""/>
+        <a:cs typeface=""/>
+        <a:font script="Jpan" typeface="游ゴシック Light"/>
+        <a:font script="Hang" typeface="맑은 고딕"/>
+        <a:font script="Hans" typeface="等线 Light"/>
+        <a:font script="Hant" typeface="新細明體"/>
+        <a:font script="Arab" typeface="Times New Roman"/>
+        <a:font script="Hebr" typeface="Times New Roman"/>
+        <a:font script="Thai" typeface="Angsana New"/>
+        <a:font script="Ethi" typeface="Nyala"/>
+        <a:font script="Beng" typeface="Vrinda"/>
+        <a:font script="Gujr" typeface="Shruti"/>
+        <a:font script="Khmr" typeface="MoolBoran"/>
+        <a:font script="Knda" typeface="Tunga"/>
+        <a:font script="Guru" typeface="Raavi"/>
+        <a:font script="Cans" typeface="Euphemia"/>
+        <a:font script="Cher" typeface="Plantagenet Cherokee"/>
+        <a:font script="Yiii" typeface="Microsoft Yi Baiti"/>
+        <a:font script="Tibt" typeface="Microsoft Himalaya"/>
+        <a:font script="Thaa" typeface="MV Boli"/>
+        <a:font script="Deva" typeface="Mangal"/>
+        <a:font script="Telu" typeface="Gautami"/>
+        <a:font script="Taml" typeface="Latha"/>
+        <a:font script="Syrc" typeface="Estrangelo Edessa"/>
+        <a:font script="Orya" typeface="Kalinga"/>
+        <a:font script="Mlym" typeface="Kartika"/>
+        <a:font script="Laoo" typeface="DokChampa"/>
+        <a:font script="Sinh" typeface="Iskoola Pota"/>
+        <a:font script="Mong" typeface="Mongolian Baiti"/>
+        <a:font script="Viet" typeface="Times New Roman"/>
+        <a:font script="Uigh" typeface="Microsoft Uighur"/>
+        <a:font script="Geor" typeface="Sylfaen"/>
+        <a:font script="Armn" typeface="Arial"/>
+        <a:font script="Bugi" typeface="Leelawadee UI"/>
+        <a:font script="Bopo" typeface="Microsoft JhengHei"/>
+        <a:font script="Java" typeface="Javanese Text"/>
+        <a:font script="Lisu" typeface="Segoe UI"/>
+        <a:font script="Mymr" typeface="Myanmar Text"/>
+        <a:font script="Nkoo" typeface="Ebrima"/>
+        <a:font script="Olck" typeface="Nirmala UI"/>
+        <a:font script="Osma" typeface="Ebrima"/>
+        <a:font script="Phag" typeface="Phagspa"/>
+        <a:font script="Syrn" typeface="Estrangelo Edessa"/>
+        <a:font script="Syrj" typeface="Estrangelo Edessa"/>
+        <a:font script="Syre" typeface="Estrangelo Edessa"/>
+        <a:font script="Sora" typeface="Nirmala UI"/>
+        <a:font script="Tale" typeface="Microsoft Tai Le"/>
+        <a:font script="Talu" typeface="Microsoft New Tai Lue"/>
+        <a:font script="Tfng" typeface="Ebrima"/>
+      </a:majorFont>
+      <a:minorFont>
+        <a:latin typeface="Aptos" panose="02110004020202020204"/>
+        <a:ea typeface=""/>
+        <a:cs typeface=""/>
+        <a:font script="Jpan" typeface="游ゴシック"/>
+        <a:font script="Hang" typeface="맑은 고딕"/>
+        <a:font script="Hans" typeface="等线"/>
+        <a:font script="Hant" typeface="新細明體"/>
+        <a:font script="Arab" typeface="Arial"/>
+        <a:font script="Hebr" typeface="Arial"/>
+        <a:font script="Thai" typeface="Cordia New"/>
+        <a:font script="Ethi" typeface="Nyala"/>
+        <a:font script="Beng" typeface="Vrinda"/>
+        <a:font script="Gujr" typeface="Shruti"/>
+        <a:font script="Khmr" typeface="DaunPenh"/>
+        <a:font script="Knda" typeface="Tunga"/>
+        <a:font script="Guru" typeface="Raavi"/>
+        <a:font script="Cans" typeface="Euphemia"/>
+        <a:font script="Cher" typeface="Plantagenet Cherokee"/>
+        <a:font script="Yiii" typeface="Microsoft Yi Baiti"/>
+        <a:font script="Tibt" typeface="Microsoft Himalaya"/>
+        <a:font script="Thaa" typeface="MV Boli"/>
+        <a:font script="Deva" typeface="Mangal"/>
+        <a:font script="Telu" typeface="Gautami"/>
+        <a:font script="Taml" typeface="Latha"/>
+        <a:font script="Syrc" typeface="Estrangelo Edessa"/>
+        <a:font script="Orya" typeface="Kalinga"/>
+        <a:font script="Mlym" typeface="Kartika"/>
+        <a:font script="Laoo" typeface="DokChampa"/>
+        <a:font script="Sinh" typeface="Iskoola Pota"/>
+        <a:font script="Mong" typeface="Mongolian Baiti"/>
+        <a:font script="Viet" typeface="Arial"/>
+        <a:font script="Uigh" typeface="Microsoft Uighur"/>
+        <a:font script="Geor" typeface="Sylfaen"/>
+        <a:font script="Armn" typeface="Arial"/>
+        <a:font script="Bugi" typeface="Leelawadee UI"/>
+        <a:font script="Bopo" typeface="Microsoft JhengHei"/>
+        <a:font script="Java" typeface="Javanese Text"/>
+        <a:font script="Lisu" typeface="Segoe UI"/>
+        <a:font script="Mymr" typeface="Myanmar Text"/>
+        <a:font script="Nkoo" typeface="Ebrima"/>
+        <a:font script="Olck" typeface="Nirmala UI"/>
+        <a:font script="Osma" typeface="Ebrima"/>
+        <a:font script="Phag" typeface="Phagspa"/>
+        <a:font script="Syrn" typeface="Estrangelo Edessa"/>
+        <a:font script="Syrj" typeface="Estrangelo Edessa"/>
+        <a:font script="Syre" typeface="Estrangelo Edessa"/>
+        <a:font script="Sora" typeface="Nirmala UI"/>
+        <a:font script="Tale" typeface="Microsoft Tai Le"/>
+        <a:font script="Talu" typeface="Microsoft New Tai Lue"/>
+        <a:font script="Tfng" typeface="Ebrima"/>
+      </a:minorFont>
+    </a:fontScheme>
+    <a:fmtScheme name="Office">
+      <a:fillStyleLst>
+        <a:solidFill>
+          <a:schemeClr val="phClr"/>
+        </a:solidFill>
+        <a:gradFill rotWithShape="1">
+          <a:gsLst>
+            <a:gs pos="0">
+              <a:schemeClr val="phClr">
+                <a:lumMod val="110000"/>
+                <a:satMod val="105000"/>
+                <a:tint val="67000"/>
+              </a:schemeClr>
+            </a:gs>
+            <a:gs pos="50000">
+              <a:schemeClr val="phClr">
+                <a:lumMod val="105000"/>
+                <a:satMod val="103000"/>
+                <a:tint val="73000"/>
+              </a:schemeClr>
+            </a:gs>
+            <a:gs pos="100000">
+              <a:schemeClr val="phClr">
+                <a:lumMod val="105000"/>
+                <a:satMod val="109000"/>
+                <a:tint val="81000"/>
+              </a:schemeClr>
+            </a:gs>
+          </a:gsLst>
+          <a:lin ang="5400000" scaled="0"/>
+        </a:gradFill>
+        <a:gradFill rotWithShape="1">
+          <a:gsLst>
+            <a:gs pos="0">
+              <a:schemeClr val="phClr">
+                <a:satMod val="103000"/>
+                <a:lumMod val="102000"/>
+                <a:tint val="94000"/>
+              </a:schemeClr>
+            </a:gs>
+            <a:gs pos="50000">
+              <a:schemeClr val="phClr">
+                <a:satMod val="110000"/>
+                <a:lumMod val="100000"/>
+                <a:shade val="100000"/>
+              </a:schemeClr>
+            </a:gs>
+            <a:gs pos="100000">
+              <a:schemeClr val="phClr">
+                <a:lumMod val="99000"/>
+                <a:satMod val="120000"/>
+                <a:shade val="78000"/>
+              </a:schemeClr>
+            </a:gs>
+          </a:gsLst>
+          <a:lin ang="5400000" scaled="0"/>
+        </a:gradFill>
+      </a:fillStyleLst>
+      <a:lnStyleLst>
+        <a:ln w="12700" cap="flat" cmpd="sng" algn="ctr">
+          <a:solidFill>
+            <a:schemeClr val="phClr"/>
+          </a:solidFill>
+          <a:prstDash val="solid"/>
+          <a:miter lim="800000"/>
+        </a:ln>
+        <a:ln w="19050" cap="flat" cmpd="sng" algn="ctr">
+          <a:solidFill>
+            <a:schemeClr val="phClr"/>
+          </a:solidFill>
+          <a:prstDash val="solid"/>
+          <a:miter lim="800000"/>
+        </a:ln>
+        <a:ln w="25400" cap="flat" cmpd="sng" algn="ctr">
+          <a:solidFill>
+            <a:schemeClr val="phClr"/>
+          </a:solidFill>
+          <a:prstDash val="solid"/>
+          <a:miter lim="800000"/>
+        </a:ln>
+      </a:lnStyleLst>
+      <a:effectStyleLst>
+        <a:effectStyle>
+          <a:effectLst/>
+        </a:effectStyle>
+        <a:effectStyle>
+          <a:effectLst/>
+        </a:effectStyle>
+        <a:effectStyle>
+          <a:effectLst>
+            <a:outerShdw blurRad="57150" dist="19050" dir="5400000" algn="ctr" rotWithShape="0">
+              <a:srgbClr val="000000">
+                <a:alpha val="63000"/>
+              </a:srgbClr>
+            </a:outerShdw>
+          </a:effectLst>
+        </a:effectStyle>
+      </a:effectStyleLst>
+      <a:bgFillStyleLst>
+        <a:solidFill>
+          <a:schemeClr val="phClr"/>
+        </a:solidFill>
+        <a:solidFill>
+          <a:schemeClr val="phClr">
+            <a:tint val="95000"/>
+            <a:satMod val="170000"/>
+          </a:schemeClr>
+        </a:solidFill>
+        <a:gradFill rotWithShape="1">
+          <a:gsLst>
+            <a:gs pos="0">
+              <a:schemeClr val="phClr">
+                <a:tint val="93000"/>
+                <a:satMod val="150000"/>
+                <a:shade val="98000"/>
+                <a:lumMod val="102000"/>
+              </a:schemeClr>
+            </a:gs>
+            <a:gs pos="50000">
+              <a:schemeClr val="phClr">
+                <a:tint val="98000"/>
+                <a:satMod val="130000"/>
+                <a:shade val="90000"/>
+                <a:lumMod val="103000"/>
+              </a:schemeClr>
+            </a:gs>
+            <a:gs pos="100000">
+              <a:schemeClr val="phClr">
+                <a:shade val="63000"/>
+                <a:satMod val="120000"/>
+              </a:schemeClr>
+            </a:gs>
+          </a:gsLst>
+          <a:lin ang="5400000" scaled="0"/>
+        </a:gradFill>
+      </a:bgFillStyleLst>
+    </a:fmtScheme>
+  </a:themeElements>
+  <a:objectDefaults>
+    <a:lnDef>
+      <a:spPr/>
+      <a:bodyPr/>
+      <a:lstStyle/>
+      <a:style>
+        <a:lnRef idx="2">
+          <a:schemeClr val="accent1"/>
+        </a:lnRef>
+        <a:fillRef idx="0">
+          <a:schemeClr val="accent1"/>
+        </a:fillRef>
+        <a:effectRef idx="1">
+          <a:schemeClr val="accent1"/>
+        </a:effectRef>
+        <a:fontRef idx="minor">
+          <a:schemeClr val="tx1"/>
+        </a:fontRef>
+      </a:style>
+    </a:lnDef>
+  </a:objectDefaults>
+  <a:extraClrSchemeLst/>
+  <a:extLst>
+    <a:ext uri="{05A4C25C-085E-4340-85A3-A5531E510DB2}">
+      <thm15:themeFamily xmlns:thm15="http://schemas.microsoft.com/office/thememl/2012/main" name="Office Theme" id="{2E142A2C-CD16-42D6-873A-C26D2A0506FA}" vid="{1BDDFF52-6CD6-40A5-AB3C-68EB2F1E4D0A}"/>
+    </a:ext>
+  </a:extLst>
+</a:theme>
 </file>
</xml_diff>